<commit_message>
Update "Threading in ASP.NET" section
</commit_message>
<xml_diff>
--- a/slides.pptx
+++ b/slides.pptx
@@ -18,10 +18,10 @@
     <p:sldId id="262" r:id="rId9"/>
     <p:sldId id="263" r:id="rId10"/>
     <p:sldId id="274" r:id="rId11"/>
-    <p:sldId id="269" r:id="rId12"/>
-    <p:sldId id="270" r:id="rId13"/>
-    <p:sldId id="271" r:id="rId14"/>
-    <p:sldId id="272" r:id="rId15"/>
+    <p:sldId id="291" r:id="rId12"/>
+    <p:sldId id="294" r:id="rId13"/>
+    <p:sldId id="292" r:id="rId14"/>
+    <p:sldId id="293" r:id="rId15"/>
     <p:sldId id="276" r:id="rId16"/>
     <p:sldId id="279" r:id="rId17"/>
     <p:sldId id="288" r:id="rId18"/>
@@ -137,6 +137,22 @@
       </a:defRPr>
     </a:lvl9pPr>
   </p:defaultTextStyle>
+  <p:extLst>
+    <p:ext uri="{EFAFB233-063F-42B5-8137-9DF3F51BA10A}">
+      <p15:sldGuideLst xmlns:p15="http://schemas.microsoft.com/office/powerpoint/2012/main">
+        <p15:guide id="1" orient="horz" pos="1620">
+          <p15:clr>
+            <a:srgbClr val="A4A3A4"/>
+          </p15:clr>
+        </p15:guide>
+        <p15:guide id="2" pos="2880">
+          <p15:clr>
+            <a:srgbClr val="A4A3A4"/>
+          </p15:clr>
+        </p15:guide>
+      </p15:sldGuideLst>
+    </p:ext>
+  </p:extLst>
 </p:presentation>
 </file>
 
@@ -4345,129 +4361,1073 @@
       </p:grpSpPr>
       <p:sp>
         <p:nvSpPr>
-          <p:cNvPr id="2" name="Title 1"/>
-          <p:cNvSpPr>
-            <a:spLocks noGrp="1"/>
-          </p:cNvSpPr>
-          <p:nvPr>
-            <p:ph type="title"/>
-          </p:nvPr>
-        </p:nvSpPr>
-        <p:spPr/>
-        <p:txBody>
-          <a:bodyPr/>
-          <a:lstStyle/>
-          <a:p>
-            <a:r>
-              <a:rPr lang="en-US" dirty="0" smtClean="0"/>
-              <a:t>ASP.NET </a:t>
-            </a:r>
-            <a:r>
-              <a:rPr lang="en-US" dirty="0" smtClean="0"/>
-              <a:t>Threading Model</a:t>
-            </a:r>
-            <a:endParaRPr lang="en-US" dirty="0"/>
-          </a:p>
-        </p:txBody>
-      </p:sp>
-      <p:sp>
-        <p:nvSpPr>
-          <p:cNvPr id="3" name="Content Placeholder 2"/>
-          <p:cNvSpPr>
-            <a:spLocks noGrp="1"/>
-          </p:cNvSpPr>
-          <p:nvPr>
-            <p:ph idx="1"/>
-          </p:nvPr>
-        </p:nvSpPr>
-        <p:spPr/>
-        <p:txBody>
-          <a:bodyPr>
-            <a:normAutofit fontScale="70000" lnSpcReduction="20000"/>
+          <p:cNvPr id="4" name="Flowchart: Multidocument 3"/>
+          <p:cNvSpPr/>
+          <p:nvPr/>
+        </p:nvSpPr>
+        <p:spPr>
+          <a:xfrm>
+            <a:off x="1524000" y="514350"/>
+            <a:ext cx="1031132" cy="1066800"/>
+          </a:xfrm>
+          <a:prstGeom prst="flowChartMultidocument">
+            <a:avLst/>
+          </a:prstGeom>
+        </p:spPr>
+        <p:style>
+          <a:lnRef idx="1">
+            <a:schemeClr val="accent1"/>
+          </a:lnRef>
+          <a:fillRef idx="2">
+            <a:schemeClr val="accent1"/>
+          </a:fillRef>
+          <a:effectRef idx="1">
+            <a:schemeClr val="accent1"/>
+          </a:effectRef>
+          <a:fontRef idx="minor">
+            <a:schemeClr val="dk1"/>
+          </a:fontRef>
+        </p:style>
+        <p:txBody>
+          <a:bodyPr rtlCol="0" anchor="ctr"/>
+          <a:lstStyle/>
+          <a:p>
+            <a:pPr algn="ctr"/>
+            <a:endParaRPr lang="en-US"/>
+          </a:p>
+        </p:txBody>
+      </p:sp>
+      <p:sp>
+        <p:nvSpPr>
+          <p:cNvPr id="6" name="Can 5"/>
+          <p:cNvSpPr/>
+          <p:nvPr/>
+        </p:nvSpPr>
+        <p:spPr>
+          <a:xfrm>
+            <a:off x="3926732" y="438150"/>
+            <a:ext cx="990600" cy="1219200"/>
+          </a:xfrm>
+          <a:prstGeom prst="can">
+            <a:avLst/>
+          </a:prstGeom>
+        </p:spPr>
+        <p:style>
+          <a:lnRef idx="1">
+            <a:schemeClr val="accent1"/>
+          </a:lnRef>
+          <a:fillRef idx="2">
+            <a:schemeClr val="accent1"/>
+          </a:fillRef>
+          <a:effectRef idx="1">
+            <a:schemeClr val="accent1"/>
+          </a:effectRef>
+          <a:fontRef idx="minor">
+            <a:schemeClr val="dk1"/>
+          </a:fontRef>
+        </p:style>
+        <p:txBody>
+          <a:bodyPr rtlCol="0" anchor="ctr"/>
+          <a:lstStyle/>
+          <a:p>
+            <a:pPr algn="ctr"/>
+            <a:endParaRPr lang="en-US"/>
+          </a:p>
+        </p:txBody>
+      </p:sp>
+      <p:sp>
+        <p:nvSpPr>
+          <p:cNvPr id="7" name="Oval 6"/>
+          <p:cNvSpPr/>
+          <p:nvPr/>
+        </p:nvSpPr>
+        <p:spPr>
+          <a:xfrm>
+            <a:off x="4002932" y="838200"/>
+            <a:ext cx="188068" cy="188068"/>
+          </a:xfrm>
+          <a:prstGeom prst="ellipse">
+            <a:avLst/>
+          </a:prstGeom>
+        </p:spPr>
+        <p:style>
+          <a:lnRef idx="0">
+            <a:schemeClr val="accent1"/>
+          </a:lnRef>
+          <a:fillRef idx="3">
+            <a:schemeClr val="accent1"/>
+          </a:fillRef>
+          <a:effectRef idx="3">
+            <a:schemeClr val="accent1"/>
+          </a:effectRef>
+          <a:fontRef idx="minor">
+            <a:schemeClr val="lt1"/>
+          </a:fontRef>
+        </p:style>
+        <p:txBody>
+          <a:bodyPr rtlCol="0" anchor="ctr"/>
+          <a:lstStyle/>
+          <a:p>
+            <a:pPr algn="ctr"/>
+            <a:endParaRPr lang="en-US"/>
+          </a:p>
+        </p:txBody>
+      </p:sp>
+      <p:sp>
+        <p:nvSpPr>
+          <p:cNvPr id="15" name="Circular Arrow 14"/>
+          <p:cNvSpPr/>
+          <p:nvPr/>
+        </p:nvSpPr>
+        <p:spPr>
+          <a:xfrm>
+            <a:off x="6067880" y="293298"/>
+            <a:ext cx="1516452" cy="1516452"/>
+          </a:xfrm>
+          <a:prstGeom prst="circularArrow">
+            <a:avLst/>
+          </a:prstGeom>
+        </p:spPr>
+        <p:style>
+          <a:lnRef idx="1">
+            <a:schemeClr val="accent1"/>
+          </a:lnRef>
+          <a:fillRef idx="2">
+            <a:schemeClr val="accent1"/>
+          </a:fillRef>
+          <a:effectRef idx="1">
+            <a:schemeClr val="accent1"/>
+          </a:effectRef>
+          <a:fontRef idx="minor">
+            <a:schemeClr val="dk1"/>
+          </a:fontRef>
+        </p:style>
+        <p:txBody>
+          <a:bodyPr rtlCol="0" anchor="ctr"/>
+          <a:lstStyle/>
+          <a:p>
+            <a:pPr algn="ctr"/>
+            <a:endParaRPr lang="en-US">
+              <a:solidFill>
+                <a:schemeClr val="tx1"/>
+              </a:solidFill>
+            </a:endParaRPr>
+          </a:p>
+        </p:txBody>
+      </p:sp>
+      <p:sp>
+        <p:nvSpPr>
+          <p:cNvPr id="16" name="Circular Arrow 15"/>
+          <p:cNvSpPr/>
+          <p:nvPr/>
+        </p:nvSpPr>
+        <p:spPr>
+          <a:xfrm rot="10800000">
+            <a:off x="6067880" y="369498"/>
+            <a:ext cx="1516452" cy="1516452"/>
+          </a:xfrm>
+          <a:prstGeom prst="circularArrow">
+            <a:avLst/>
+          </a:prstGeom>
+        </p:spPr>
+        <p:style>
+          <a:lnRef idx="1">
+            <a:schemeClr val="accent1"/>
+          </a:lnRef>
+          <a:fillRef idx="2">
+            <a:schemeClr val="accent1"/>
+          </a:fillRef>
+          <a:effectRef idx="1">
+            <a:schemeClr val="accent1"/>
+          </a:effectRef>
+          <a:fontRef idx="minor">
+            <a:schemeClr val="dk1"/>
+          </a:fontRef>
+        </p:style>
+        <p:txBody>
+          <a:bodyPr rtlCol="0" anchor="ctr"/>
+          <a:lstStyle/>
+          <a:p>
+            <a:pPr algn="ctr"/>
+            <a:endParaRPr lang="en-US">
+              <a:solidFill>
+                <a:schemeClr val="tx1"/>
+              </a:solidFill>
+            </a:endParaRPr>
+          </a:p>
+        </p:txBody>
+      </p:sp>
+      <p:sp>
+        <p:nvSpPr>
+          <p:cNvPr id="18" name="Flowchart: Multidocument 17"/>
+          <p:cNvSpPr/>
+          <p:nvPr/>
+        </p:nvSpPr>
+        <p:spPr>
+          <a:xfrm>
+            <a:off x="1524000" y="3173802"/>
+            <a:ext cx="1031132" cy="1066800"/>
+          </a:xfrm>
+          <a:prstGeom prst="flowChartMultidocument">
+            <a:avLst/>
+          </a:prstGeom>
+        </p:spPr>
+        <p:style>
+          <a:lnRef idx="1">
+            <a:schemeClr val="accent2"/>
+          </a:lnRef>
+          <a:fillRef idx="2">
+            <a:schemeClr val="accent2"/>
+          </a:fillRef>
+          <a:effectRef idx="1">
+            <a:schemeClr val="accent2"/>
+          </a:effectRef>
+          <a:fontRef idx="minor">
+            <a:schemeClr val="dk1"/>
+          </a:fontRef>
+        </p:style>
+        <p:txBody>
+          <a:bodyPr rtlCol="0" anchor="ctr"/>
+          <a:lstStyle/>
+          <a:p>
+            <a:pPr algn="ctr"/>
+            <a:endParaRPr lang="en-US"/>
+          </a:p>
+        </p:txBody>
+      </p:sp>
+      <p:sp>
+        <p:nvSpPr>
+          <p:cNvPr id="19" name="Can 18"/>
+          <p:cNvSpPr/>
+          <p:nvPr/>
+        </p:nvSpPr>
+        <p:spPr>
+          <a:xfrm>
+            <a:off x="3926732" y="3097602"/>
+            <a:ext cx="990600" cy="1219200"/>
+          </a:xfrm>
+          <a:prstGeom prst="can">
+            <a:avLst/>
+          </a:prstGeom>
+        </p:spPr>
+        <p:style>
+          <a:lnRef idx="1">
+            <a:schemeClr val="accent2"/>
+          </a:lnRef>
+          <a:fillRef idx="2">
+            <a:schemeClr val="accent2"/>
+          </a:fillRef>
+          <a:effectRef idx="1">
+            <a:schemeClr val="accent2"/>
+          </a:effectRef>
+          <a:fontRef idx="minor">
+            <a:schemeClr val="dk1"/>
+          </a:fontRef>
+        </p:style>
+        <p:txBody>
+          <a:bodyPr rtlCol="0" anchor="ctr"/>
+          <a:lstStyle/>
+          <a:p>
+            <a:pPr algn="ctr"/>
+            <a:endParaRPr lang="en-US"/>
+          </a:p>
+        </p:txBody>
+      </p:sp>
+      <p:sp>
+        <p:nvSpPr>
+          <p:cNvPr id="23" name="Circular Arrow 22"/>
+          <p:cNvSpPr/>
+          <p:nvPr/>
+        </p:nvSpPr>
+        <p:spPr>
+          <a:xfrm>
+            <a:off x="6067880" y="2952750"/>
+            <a:ext cx="1516452" cy="1516452"/>
+          </a:xfrm>
+          <a:prstGeom prst="circularArrow">
+            <a:avLst/>
+          </a:prstGeom>
+        </p:spPr>
+        <p:style>
+          <a:lnRef idx="1">
+            <a:schemeClr val="accent2"/>
+          </a:lnRef>
+          <a:fillRef idx="2">
+            <a:schemeClr val="accent2"/>
+          </a:fillRef>
+          <a:effectRef idx="1">
+            <a:schemeClr val="accent2"/>
+          </a:effectRef>
+          <a:fontRef idx="minor">
+            <a:schemeClr val="dk1"/>
+          </a:fontRef>
+        </p:style>
+        <p:txBody>
+          <a:bodyPr rtlCol="0" anchor="ctr"/>
+          <a:lstStyle/>
+          <a:p>
+            <a:pPr algn="ctr"/>
+            <a:endParaRPr lang="en-US">
+              <a:solidFill>
+                <a:schemeClr val="tx1"/>
+              </a:solidFill>
+            </a:endParaRPr>
+          </a:p>
+        </p:txBody>
+      </p:sp>
+      <p:sp>
+        <p:nvSpPr>
+          <p:cNvPr id="24" name="Circular Arrow 23"/>
+          <p:cNvSpPr/>
+          <p:nvPr/>
+        </p:nvSpPr>
+        <p:spPr>
+          <a:xfrm rot="10800000">
+            <a:off x="6067880" y="3028950"/>
+            <a:ext cx="1516452" cy="1516452"/>
+          </a:xfrm>
+          <a:prstGeom prst="circularArrow">
+            <a:avLst/>
+          </a:prstGeom>
+        </p:spPr>
+        <p:style>
+          <a:lnRef idx="1">
+            <a:schemeClr val="accent2"/>
+          </a:lnRef>
+          <a:fillRef idx="2">
+            <a:schemeClr val="accent2"/>
+          </a:fillRef>
+          <a:effectRef idx="1">
+            <a:schemeClr val="accent2"/>
+          </a:effectRef>
+          <a:fontRef idx="minor">
+            <a:schemeClr val="dk1"/>
+          </a:fontRef>
+        </p:style>
+        <p:txBody>
+          <a:bodyPr rtlCol="0" anchor="ctr"/>
+          <a:lstStyle/>
+          <a:p>
+            <a:pPr algn="ctr"/>
+            <a:endParaRPr lang="en-US">
+              <a:solidFill>
+                <a:schemeClr val="tx1"/>
+              </a:solidFill>
+            </a:endParaRPr>
+          </a:p>
+        </p:txBody>
+      </p:sp>
+      <p:cxnSp>
+        <p:nvCxnSpPr>
+          <p:cNvPr id="27" name="Straight Arrow Connector 26"/>
+          <p:cNvCxnSpPr/>
+          <p:nvPr/>
+        </p:nvCxnSpPr>
+        <p:spPr>
+          <a:xfrm>
+            <a:off x="304800" y="1047750"/>
+            <a:ext cx="1066800" cy="0"/>
+          </a:xfrm>
+          <a:prstGeom prst="straightConnector1">
+            <a:avLst/>
+          </a:prstGeom>
+          <a:ln w="50800">
+            <a:tailEnd type="stealth"/>
+          </a:ln>
+        </p:spPr>
+        <p:style>
+          <a:lnRef idx="1">
+            <a:schemeClr val="accent1"/>
+          </a:lnRef>
+          <a:fillRef idx="0">
+            <a:schemeClr val="accent1"/>
+          </a:fillRef>
+          <a:effectRef idx="0">
+            <a:schemeClr val="accent1"/>
+          </a:effectRef>
+          <a:fontRef idx="minor">
+            <a:schemeClr val="tx1"/>
+          </a:fontRef>
+        </p:style>
+      </p:cxnSp>
+      <p:cxnSp>
+        <p:nvCxnSpPr>
+          <p:cNvPr id="28" name="Straight Arrow Connector 27"/>
+          <p:cNvCxnSpPr/>
+          <p:nvPr/>
+        </p:nvCxnSpPr>
+        <p:spPr>
+          <a:xfrm>
+            <a:off x="2743200" y="1028700"/>
+            <a:ext cx="1066800" cy="0"/>
+          </a:xfrm>
+          <a:prstGeom prst="straightConnector1">
+            <a:avLst/>
+          </a:prstGeom>
+          <a:ln w="50800">
+            <a:tailEnd type="stealth"/>
+          </a:ln>
+        </p:spPr>
+        <p:style>
+          <a:lnRef idx="1">
+            <a:schemeClr val="accent1"/>
+          </a:lnRef>
+          <a:fillRef idx="0">
+            <a:schemeClr val="accent1"/>
+          </a:fillRef>
+          <a:effectRef idx="0">
+            <a:schemeClr val="accent1"/>
+          </a:effectRef>
+          <a:fontRef idx="minor">
+            <a:schemeClr val="tx1"/>
+          </a:fontRef>
+        </p:style>
+      </p:cxnSp>
+      <p:cxnSp>
+        <p:nvCxnSpPr>
+          <p:cNvPr id="30" name="Straight Arrow Connector 29"/>
+          <p:cNvCxnSpPr/>
+          <p:nvPr/>
+        </p:nvCxnSpPr>
+        <p:spPr>
+          <a:xfrm>
+            <a:off x="5029200" y="1038225"/>
+            <a:ext cx="1038680" cy="0"/>
+          </a:xfrm>
+          <a:prstGeom prst="straightConnector1">
+            <a:avLst/>
+          </a:prstGeom>
+          <a:ln w="50800">
+            <a:tailEnd type="stealth"/>
+          </a:ln>
+        </p:spPr>
+        <p:style>
+          <a:lnRef idx="1">
+            <a:schemeClr val="accent1"/>
+          </a:lnRef>
+          <a:fillRef idx="0">
+            <a:schemeClr val="accent1"/>
+          </a:fillRef>
+          <a:effectRef idx="0">
+            <a:schemeClr val="accent1"/>
+          </a:effectRef>
+          <a:fontRef idx="minor">
+            <a:schemeClr val="tx1"/>
+          </a:fontRef>
+        </p:style>
+      </p:cxnSp>
+      <p:cxnSp>
+        <p:nvCxnSpPr>
+          <p:cNvPr id="32" name="Straight Arrow Connector 31"/>
+          <p:cNvCxnSpPr/>
+          <p:nvPr/>
+        </p:nvCxnSpPr>
+        <p:spPr>
+          <a:xfrm>
+            <a:off x="2743200" y="3714750"/>
+            <a:ext cx="1066800" cy="0"/>
+          </a:xfrm>
+          <a:prstGeom prst="straightConnector1">
+            <a:avLst/>
+          </a:prstGeom>
+          <a:ln w="50800">
+            <a:tailEnd type="stealth"/>
+          </a:ln>
+        </p:spPr>
+        <p:style>
+          <a:lnRef idx="1">
+            <a:schemeClr val="accent2"/>
+          </a:lnRef>
+          <a:fillRef idx="0">
+            <a:schemeClr val="accent2"/>
+          </a:fillRef>
+          <a:effectRef idx="0">
+            <a:schemeClr val="accent2"/>
+          </a:effectRef>
+          <a:fontRef idx="minor">
+            <a:schemeClr val="tx1"/>
+          </a:fontRef>
+        </p:style>
+      </p:cxnSp>
+      <p:cxnSp>
+        <p:nvCxnSpPr>
+          <p:cNvPr id="33" name="Straight Arrow Connector 32"/>
+          <p:cNvCxnSpPr/>
+          <p:nvPr/>
+        </p:nvCxnSpPr>
+        <p:spPr>
+          <a:xfrm>
+            <a:off x="5029200" y="3724275"/>
+            <a:ext cx="1038680" cy="0"/>
+          </a:xfrm>
+          <a:prstGeom prst="straightConnector1">
+            <a:avLst/>
+          </a:prstGeom>
+          <a:ln w="50800">
+            <a:tailEnd type="stealth"/>
+          </a:ln>
+        </p:spPr>
+        <p:style>
+          <a:lnRef idx="1">
+            <a:schemeClr val="accent2"/>
+          </a:lnRef>
+          <a:fillRef idx="0">
+            <a:schemeClr val="accent2"/>
+          </a:fillRef>
+          <a:effectRef idx="0">
+            <a:schemeClr val="accent2"/>
+          </a:effectRef>
+          <a:fontRef idx="minor">
+            <a:schemeClr val="tx1"/>
+          </a:fontRef>
+        </p:style>
+      </p:cxnSp>
+      <p:sp>
+        <p:nvSpPr>
+          <p:cNvPr id="35" name="TextBox 34"/>
+          <p:cNvSpPr txBox="1"/>
+          <p:nvPr/>
+        </p:nvSpPr>
+        <p:spPr>
+          <a:xfrm>
+            <a:off x="1111368" y="1547396"/>
+            <a:ext cx="1708032" cy="338554"/>
+          </a:xfrm>
+          <a:prstGeom prst="rect">
+            <a:avLst/>
+          </a:prstGeom>
+          <a:noFill/>
+        </p:spPr>
+        <p:txBody>
+          <a:bodyPr wrap="none" rtlCol="0">
+            <a:spAutoFit/>
           </a:bodyPr>
           <a:lstStyle/>
           <a:p>
-            <a:r>
-              <a:rPr lang="en-US" dirty="0" smtClean="0"/>
-              <a:t>IIS and ASP.NET maintain two different thread pools</a:t>
-            </a:r>
-          </a:p>
-          <a:p>
-            <a:endParaRPr lang="en-US" dirty="0"/>
-          </a:p>
-          <a:p>
-            <a:r>
-              <a:rPr lang="en-US" dirty="0" smtClean="0"/>
-              <a:t>Incoming requests are first dispatched to </a:t>
-            </a:r>
-            <a:r>
-              <a:rPr lang="en-US" b="1" dirty="0" smtClean="0"/>
-              <a:t>IIS thread pool</a:t>
-            </a:r>
-          </a:p>
-          <a:p>
-            <a:pPr lvl="1"/>
-            <a:r>
-              <a:rPr lang="en-US" dirty="0" smtClean="0"/>
-              <a:t>Used for processing unmanaged modules</a:t>
-            </a:r>
-          </a:p>
-          <a:p>
-            <a:pPr lvl="1"/>
-            <a:r>
-              <a:rPr lang="en-US" dirty="0" smtClean="0"/>
-              <a:t>Highly optimized for certain scenarios, e.g. serving static files</a:t>
-            </a:r>
-          </a:p>
-          <a:p>
-            <a:endParaRPr lang="en-US" dirty="0"/>
-          </a:p>
-          <a:p>
-            <a:r>
-              <a:rPr lang="en-US" dirty="0" smtClean="0"/>
-              <a:t>If ASP.NET code needs to run (e.g., .</a:t>
-            </a:r>
-            <a:r>
-              <a:rPr lang="en-US" dirty="0" err="1" smtClean="0"/>
-              <a:t>aspx</a:t>
-            </a:r>
-            <a:r>
-              <a:rPr lang="en-US" dirty="0" smtClean="0"/>
-              <a:t>, </a:t>
-            </a:r>
-            <a:r>
-              <a:rPr lang="en-US" dirty="0" err="1" smtClean="0"/>
-              <a:t>extensionless</a:t>
-            </a:r>
-            <a:r>
-              <a:rPr lang="en-US" dirty="0" smtClean="0"/>
-              <a:t>), request is then dispatched to </a:t>
-            </a:r>
-            <a:r>
-              <a:rPr lang="en-US" b="1" dirty="0" smtClean="0"/>
-              <a:t>CLR thread pool</a:t>
-            </a:r>
-          </a:p>
-          <a:p>
-            <a:pPr lvl="1"/>
-            <a:r>
-              <a:rPr lang="en-US" dirty="0" smtClean="0"/>
-              <a:t>CLR thread pool optimized for processing managed code</a:t>
-            </a:r>
-          </a:p>
-          <a:p>
-            <a:pPr lvl="1"/>
-            <a:r>
-              <a:rPr lang="en-US" dirty="0" smtClean="0"/>
-              <a:t>Original thread released back to IIS thread pool</a:t>
-            </a:r>
+            <a:pPr algn="ctr"/>
+            <a:r>
+              <a:rPr lang="en-US" sz="1600" dirty="0" smtClean="0"/>
+              <a:t>IIS Request Queue</a:t>
+            </a:r>
+            <a:endParaRPr lang="en-US" sz="1600" dirty="0"/>
+          </a:p>
+        </p:txBody>
+      </p:sp>
+      <p:sp>
+        <p:nvSpPr>
+          <p:cNvPr id="36" name="TextBox 35"/>
+          <p:cNvSpPr txBox="1"/>
+          <p:nvPr/>
+        </p:nvSpPr>
+        <p:spPr>
+          <a:xfrm>
+            <a:off x="3709529" y="1623596"/>
+            <a:ext cx="1425006" cy="338554"/>
+          </a:xfrm>
+          <a:prstGeom prst="rect">
+            <a:avLst/>
+          </a:prstGeom>
+          <a:noFill/>
+        </p:spPr>
+        <p:txBody>
+          <a:bodyPr wrap="none" rtlCol="0">
+            <a:spAutoFit/>
+          </a:bodyPr>
+          <a:lstStyle/>
+          <a:p>
+            <a:pPr algn="ctr"/>
+            <a:r>
+              <a:rPr lang="en-US" sz="1600" dirty="0" smtClean="0"/>
+              <a:t>IIS Thread Pool</a:t>
+            </a:r>
+            <a:endParaRPr lang="en-US" sz="1600" dirty="0"/>
+          </a:p>
+        </p:txBody>
+      </p:sp>
+      <p:sp>
+        <p:nvSpPr>
+          <p:cNvPr id="37" name="TextBox 36"/>
+          <p:cNvSpPr txBox="1"/>
+          <p:nvPr/>
+        </p:nvSpPr>
+        <p:spPr>
+          <a:xfrm>
+            <a:off x="5526496" y="1775996"/>
+            <a:ext cx="2583336" cy="584775"/>
+          </a:xfrm>
+          <a:prstGeom prst="rect">
+            <a:avLst/>
+          </a:prstGeom>
+          <a:noFill/>
+        </p:spPr>
+        <p:txBody>
+          <a:bodyPr wrap="none" rtlCol="0">
+            <a:spAutoFit/>
+          </a:bodyPr>
+          <a:lstStyle/>
+          <a:p>
+            <a:pPr algn="ctr"/>
+            <a:r>
+              <a:rPr lang="en-US" sz="1600" dirty="0" smtClean="0"/>
+              <a:t>IIS Native Thread</a:t>
+            </a:r>
+            <a:br>
+              <a:rPr lang="en-US" sz="1600" dirty="0" smtClean="0"/>
+            </a:br>
+            <a:r>
+              <a:rPr lang="en-US" sz="1600" dirty="0" smtClean="0"/>
+              <a:t>(native modules / static files)</a:t>
+            </a:r>
+            <a:endParaRPr lang="en-US" sz="1600" dirty="0"/>
+          </a:p>
+        </p:txBody>
+      </p:sp>
+      <p:sp>
+        <p:nvSpPr>
+          <p:cNvPr id="38" name="TextBox 37"/>
+          <p:cNvSpPr txBox="1"/>
+          <p:nvPr/>
+        </p:nvSpPr>
+        <p:spPr>
+          <a:xfrm>
+            <a:off x="838200" y="4248150"/>
+            <a:ext cx="2188420" cy="338554"/>
+          </a:xfrm>
+          <a:prstGeom prst="rect">
+            <a:avLst/>
+          </a:prstGeom>
+          <a:noFill/>
+        </p:spPr>
+        <p:txBody>
+          <a:bodyPr wrap="none" rtlCol="0">
+            <a:spAutoFit/>
+          </a:bodyPr>
+          <a:lstStyle/>
+          <a:p>
+            <a:pPr algn="ctr"/>
+            <a:r>
+              <a:rPr lang="en-US" sz="1600" dirty="0" smtClean="0"/>
+              <a:t>ASP.NET Request Queue</a:t>
+            </a:r>
+            <a:endParaRPr lang="en-US" sz="1600" dirty="0"/>
+          </a:p>
+        </p:txBody>
+      </p:sp>
+      <p:sp>
+        <p:nvSpPr>
+          <p:cNvPr id="39" name="TextBox 38"/>
+          <p:cNvSpPr txBox="1"/>
+          <p:nvPr/>
+        </p:nvSpPr>
+        <p:spPr>
+          <a:xfrm>
+            <a:off x="3657600" y="4290596"/>
+            <a:ext cx="1535613" cy="338554"/>
+          </a:xfrm>
+          <a:prstGeom prst="rect">
+            <a:avLst/>
+          </a:prstGeom>
+          <a:noFill/>
+        </p:spPr>
+        <p:txBody>
+          <a:bodyPr wrap="none" rtlCol="0">
+            <a:spAutoFit/>
+          </a:bodyPr>
+          <a:lstStyle/>
+          <a:p>
+            <a:pPr algn="ctr"/>
+            <a:r>
+              <a:rPr lang="en-US" sz="1600" dirty="0" smtClean="0"/>
+              <a:t>CLR Thread Pool</a:t>
+            </a:r>
+            <a:endParaRPr lang="en-US" sz="1600" dirty="0"/>
+          </a:p>
+        </p:txBody>
+      </p:sp>
+      <p:sp>
+        <p:nvSpPr>
+          <p:cNvPr id="40" name="TextBox 39"/>
+          <p:cNvSpPr txBox="1"/>
+          <p:nvPr/>
+        </p:nvSpPr>
+        <p:spPr>
+          <a:xfrm>
+            <a:off x="5181045" y="4442996"/>
+            <a:ext cx="3383555" cy="584775"/>
+          </a:xfrm>
+          <a:prstGeom prst="rect">
+            <a:avLst/>
+          </a:prstGeom>
+          <a:noFill/>
+        </p:spPr>
+        <p:txBody>
+          <a:bodyPr wrap="none" rtlCol="0">
+            <a:spAutoFit/>
+          </a:bodyPr>
+          <a:lstStyle/>
+          <a:p>
+            <a:pPr algn="ctr"/>
+            <a:r>
+              <a:rPr lang="en-US" sz="1600" dirty="0" smtClean="0"/>
+              <a:t>CLR Thread Pool Thread</a:t>
+            </a:r>
+            <a:br>
+              <a:rPr lang="en-US" sz="1600" dirty="0" smtClean="0"/>
+            </a:br>
+            <a:r>
+              <a:rPr lang="en-US" sz="1600" dirty="0" smtClean="0"/>
+              <a:t>(application code / managed modules)</a:t>
+            </a:r>
+            <a:endParaRPr lang="en-US" sz="1600" dirty="0"/>
+          </a:p>
+        </p:txBody>
+      </p:sp>
+      <p:sp>
+        <p:nvSpPr>
+          <p:cNvPr id="73" name="Flowchart: Document 72"/>
+          <p:cNvSpPr/>
+          <p:nvPr/>
+        </p:nvSpPr>
+        <p:spPr>
+          <a:xfrm>
+            <a:off x="384436" y="1123950"/>
+            <a:ext cx="295883" cy="304800"/>
+          </a:xfrm>
+          <a:prstGeom prst="flowChartDocument">
+            <a:avLst/>
+          </a:prstGeom>
+        </p:spPr>
+        <p:style>
+          <a:lnRef idx="0">
+            <a:schemeClr val="accent1"/>
+          </a:lnRef>
+          <a:fillRef idx="3">
+            <a:schemeClr val="accent1"/>
+          </a:fillRef>
+          <a:effectRef idx="3">
+            <a:schemeClr val="accent1"/>
+          </a:effectRef>
+          <a:fontRef idx="minor">
+            <a:schemeClr val="lt1"/>
+          </a:fontRef>
+        </p:style>
+        <p:txBody>
+          <a:bodyPr rtlCol="0" anchor="ctr"/>
+          <a:lstStyle/>
+          <a:p>
+            <a:pPr algn="ctr"/>
+            <a:endParaRPr lang="en-US"/>
+          </a:p>
+        </p:txBody>
+      </p:sp>
+      <p:sp>
+        <p:nvSpPr>
+          <p:cNvPr id="74" name="Oval 73"/>
+          <p:cNvSpPr/>
+          <p:nvPr/>
+        </p:nvSpPr>
+        <p:spPr>
+          <a:xfrm>
+            <a:off x="4422032" y="896566"/>
+            <a:ext cx="188068" cy="188068"/>
+          </a:xfrm>
+          <a:prstGeom prst="ellipse">
+            <a:avLst/>
+          </a:prstGeom>
+        </p:spPr>
+        <p:style>
+          <a:lnRef idx="0">
+            <a:schemeClr val="accent1"/>
+          </a:lnRef>
+          <a:fillRef idx="3">
+            <a:schemeClr val="accent1"/>
+          </a:fillRef>
+          <a:effectRef idx="3">
+            <a:schemeClr val="accent1"/>
+          </a:effectRef>
+          <a:fontRef idx="minor">
+            <a:schemeClr val="lt1"/>
+          </a:fontRef>
+        </p:style>
+        <p:txBody>
+          <a:bodyPr rtlCol="0" anchor="ctr"/>
+          <a:lstStyle/>
+          <a:p>
+            <a:pPr algn="ctr"/>
+            <a:endParaRPr lang="en-US"/>
+          </a:p>
+        </p:txBody>
+      </p:sp>
+      <p:sp>
+        <p:nvSpPr>
+          <p:cNvPr id="75" name="Oval 74"/>
+          <p:cNvSpPr/>
+          <p:nvPr/>
+        </p:nvSpPr>
+        <p:spPr>
+          <a:xfrm>
+            <a:off x="4137498" y="1276350"/>
+            <a:ext cx="188068" cy="188068"/>
+          </a:xfrm>
+          <a:prstGeom prst="ellipse">
+            <a:avLst/>
+          </a:prstGeom>
+        </p:spPr>
+        <p:style>
+          <a:lnRef idx="0">
+            <a:schemeClr val="accent1"/>
+          </a:lnRef>
+          <a:fillRef idx="3">
+            <a:schemeClr val="accent1"/>
+          </a:fillRef>
+          <a:effectRef idx="3">
+            <a:schemeClr val="accent1"/>
+          </a:effectRef>
+          <a:fontRef idx="minor">
+            <a:schemeClr val="lt1"/>
+          </a:fontRef>
+        </p:style>
+        <p:txBody>
+          <a:bodyPr rtlCol="0" anchor="ctr"/>
+          <a:lstStyle/>
+          <a:p>
+            <a:pPr algn="ctr"/>
+            <a:endParaRPr lang="en-US"/>
+          </a:p>
+        </p:txBody>
+      </p:sp>
+      <p:sp>
+        <p:nvSpPr>
+          <p:cNvPr id="76" name="Oval 75"/>
+          <p:cNvSpPr/>
+          <p:nvPr/>
+        </p:nvSpPr>
+        <p:spPr>
+          <a:xfrm>
+            <a:off x="4612532" y="1047750"/>
+            <a:ext cx="188068" cy="188068"/>
+          </a:xfrm>
+          <a:prstGeom prst="ellipse">
+            <a:avLst/>
+          </a:prstGeom>
+        </p:spPr>
+        <p:style>
+          <a:lnRef idx="0">
+            <a:schemeClr val="accent1"/>
+          </a:lnRef>
+          <a:fillRef idx="3">
+            <a:schemeClr val="accent1"/>
+          </a:fillRef>
+          <a:effectRef idx="3">
+            <a:schemeClr val="accent1"/>
+          </a:effectRef>
+          <a:fontRef idx="minor">
+            <a:schemeClr val="lt1"/>
+          </a:fontRef>
+        </p:style>
+        <p:txBody>
+          <a:bodyPr rtlCol="0" anchor="ctr"/>
+          <a:lstStyle/>
+          <a:p>
+            <a:pPr algn="ctr"/>
+            <a:endParaRPr lang="en-US"/>
+          </a:p>
+        </p:txBody>
+      </p:sp>
+      <p:sp>
+        <p:nvSpPr>
+          <p:cNvPr id="77" name="Oval 76"/>
+          <p:cNvSpPr/>
+          <p:nvPr/>
+        </p:nvSpPr>
+        <p:spPr>
+          <a:xfrm>
+            <a:off x="4213698" y="1038225"/>
+            <a:ext cx="188068" cy="188068"/>
+          </a:xfrm>
+          <a:prstGeom prst="ellipse">
+            <a:avLst/>
+          </a:prstGeom>
+        </p:spPr>
+        <p:style>
+          <a:lnRef idx="0">
+            <a:schemeClr val="accent1"/>
+          </a:lnRef>
+          <a:fillRef idx="3">
+            <a:schemeClr val="accent1"/>
+          </a:fillRef>
+          <a:effectRef idx="3">
+            <a:schemeClr val="accent1"/>
+          </a:effectRef>
+          <a:fontRef idx="minor">
+            <a:schemeClr val="lt1"/>
+          </a:fontRef>
+        </p:style>
+        <p:txBody>
+          <a:bodyPr rtlCol="0" anchor="ctr"/>
+          <a:lstStyle/>
+          <a:p>
+            <a:pPr algn="ctr"/>
+            <a:endParaRPr lang="en-US"/>
+          </a:p>
+        </p:txBody>
+      </p:sp>
+      <p:sp>
+        <p:nvSpPr>
+          <p:cNvPr id="78" name="Oval 77"/>
+          <p:cNvSpPr/>
+          <p:nvPr/>
+        </p:nvSpPr>
+        <p:spPr>
+          <a:xfrm>
+            <a:off x="4043021" y="3519134"/>
+            <a:ext cx="188068" cy="188068"/>
+          </a:xfrm>
+          <a:prstGeom prst="ellipse">
+            <a:avLst/>
+          </a:prstGeom>
+        </p:spPr>
+        <p:style>
+          <a:lnRef idx="0">
+            <a:schemeClr val="accent2"/>
+          </a:lnRef>
+          <a:fillRef idx="3">
+            <a:schemeClr val="accent2"/>
+          </a:fillRef>
+          <a:effectRef idx="3">
+            <a:schemeClr val="accent2"/>
+          </a:effectRef>
+          <a:fontRef idx="minor">
+            <a:schemeClr val="lt1"/>
+          </a:fontRef>
+        </p:style>
+        <p:txBody>
+          <a:bodyPr rtlCol="0" anchor="ctr"/>
+          <a:lstStyle/>
+          <a:p>
+            <a:pPr algn="ctr"/>
+            <a:endParaRPr lang="en-US"/>
+          </a:p>
+        </p:txBody>
+      </p:sp>
+      <p:sp>
+        <p:nvSpPr>
+          <p:cNvPr id="79" name="Oval 78"/>
+          <p:cNvSpPr/>
+          <p:nvPr/>
+        </p:nvSpPr>
+        <p:spPr>
+          <a:xfrm>
+            <a:off x="4516066" y="3540658"/>
+            <a:ext cx="188068" cy="188068"/>
+          </a:xfrm>
+          <a:prstGeom prst="ellipse">
+            <a:avLst/>
+          </a:prstGeom>
+        </p:spPr>
+        <p:style>
+          <a:lnRef idx="0">
+            <a:schemeClr val="accent2"/>
+          </a:lnRef>
+          <a:fillRef idx="3">
+            <a:schemeClr val="accent2"/>
+          </a:fillRef>
+          <a:effectRef idx="3">
+            <a:schemeClr val="accent2"/>
+          </a:effectRef>
+          <a:fontRef idx="minor">
+            <a:schemeClr val="lt1"/>
+          </a:fontRef>
+        </p:style>
+        <p:txBody>
+          <a:bodyPr rtlCol="0" anchor="ctr"/>
+          <a:lstStyle/>
+          <a:p>
+            <a:pPr algn="ctr"/>
+            <a:endParaRPr lang="en-US"/>
+          </a:p>
+        </p:txBody>
+      </p:sp>
+      <p:sp>
+        <p:nvSpPr>
+          <p:cNvPr id="80" name="Oval 79"/>
+          <p:cNvSpPr/>
+          <p:nvPr/>
+        </p:nvSpPr>
+        <p:spPr>
+          <a:xfrm>
+            <a:off x="4114800" y="3983882"/>
+            <a:ext cx="188068" cy="188068"/>
+          </a:xfrm>
+          <a:prstGeom prst="ellipse">
+            <a:avLst/>
+          </a:prstGeom>
+        </p:spPr>
+        <p:style>
+          <a:lnRef idx="0">
+            <a:schemeClr val="accent2"/>
+          </a:lnRef>
+          <a:fillRef idx="3">
+            <a:schemeClr val="accent2"/>
+          </a:fillRef>
+          <a:effectRef idx="3">
+            <a:schemeClr val="accent2"/>
+          </a:effectRef>
+          <a:fontRef idx="minor">
+            <a:schemeClr val="lt1"/>
+          </a:fontRef>
+        </p:style>
+        <p:txBody>
+          <a:bodyPr rtlCol="0" anchor="ctr"/>
+          <a:lstStyle/>
+          <a:p>
+            <a:pPr algn="ctr"/>
+            <a:endParaRPr lang="en-US"/>
+          </a:p>
+        </p:txBody>
+      </p:sp>
+      <p:sp>
+        <p:nvSpPr>
+          <p:cNvPr id="81" name="Oval 80"/>
+          <p:cNvSpPr/>
+          <p:nvPr/>
+        </p:nvSpPr>
+        <p:spPr>
+          <a:xfrm>
+            <a:off x="4213698" y="3737532"/>
+            <a:ext cx="188068" cy="188068"/>
+          </a:xfrm>
+          <a:prstGeom prst="ellipse">
+            <a:avLst/>
+          </a:prstGeom>
+        </p:spPr>
+        <p:style>
+          <a:lnRef idx="0">
+            <a:schemeClr val="accent2"/>
+          </a:lnRef>
+          <a:fillRef idx="3">
+            <a:schemeClr val="accent2"/>
+          </a:fillRef>
+          <a:effectRef idx="3">
+            <a:schemeClr val="accent2"/>
+          </a:effectRef>
+          <a:fontRef idx="minor">
+            <a:schemeClr val="lt1"/>
+          </a:fontRef>
+        </p:style>
+        <p:txBody>
+          <a:bodyPr rtlCol="0" anchor="ctr"/>
+          <a:lstStyle/>
+          <a:p>
+            <a:pPr algn="ctr"/>
+            <a:endParaRPr lang="en-US"/>
           </a:p>
         </p:txBody>
       </p:sp>
     </p:spTree>
     <p:extLst>
       <p:ext uri="{BB962C8B-B14F-4D97-AF65-F5344CB8AC3E}">
-        <p14:creationId xmlns:p14="http://schemas.microsoft.com/office/powerpoint/2010/main" val="1881354116"/>
+        <p14:creationId xmlns:p14="http://schemas.microsoft.com/office/powerpoint/2010/main" val="3430454924"/>
       </p:ext>
     </p:extLst>
   </p:cSld>
@@ -4477,9 +5437,1310 @@
   <p:timing>
     <p:tnLst>
       <p:par>
-        <p:cTn id="1" dur="indefinite" restart="never" nodeType="tmRoot"/>
+        <p:cTn id="1" dur="indefinite" restart="never" nodeType="tmRoot">
+          <p:childTnLst>
+            <p:seq concurrent="1" nextAc="seek">
+              <p:cTn id="2" dur="indefinite" nodeType="mainSeq">
+                <p:childTnLst>
+                  <p:par>
+                    <p:cTn id="3" fill="hold">
+                      <p:stCondLst>
+                        <p:cond delay="indefinite"/>
+                      </p:stCondLst>
+                      <p:childTnLst>
+                        <p:par>
+                          <p:cTn id="4" fill="hold">
+                            <p:stCondLst>
+                              <p:cond delay="0"/>
+                            </p:stCondLst>
+                            <p:childTnLst>
+                              <p:par>
+                                <p:cTn id="5" presetID="10" presetClass="entr" presetSubtype="0" fill="hold" grpId="0" nodeType="clickEffect">
+                                  <p:stCondLst>
+                                    <p:cond delay="0"/>
+                                  </p:stCondLst>
+                                  <p:childTnLst>
+                                    <p:set>
+                                      <p:cBhvr>
+                                        <p:cTn id="6" dur="1" fill="hold">
+                                          <p:stCondLst>
+                                            <p:cond delay="0"/>
+                                          </p:stCondLst>
+                                        </p:cTn>
+                                        <p:tgtEl>
+                                          <p:spTgt spid="73"/>
+                                        </p:tgtEl>
+                                        <p:attrNameLst>
+                                          <p:attrName>style.visibility</p:attrName>
+                                        </p:attrNameLst>
+                                      </p:cBhvr>
+                                      <p:to>
+                                        <p:strVal val="visible"/>
+                                      </p:to>
+                                    </p:set>
+                                    <p:animEffect transition="in" filter="fade">
+                                      <p:cBhvr>
+                                        <p:cTn id="7" dur="1000"/>
+                                        <p:tgtEl>
+                                          <p:spTgt spid="73"/>
+                                        </p:tgtEl>
+                                      </p:cBhvr>
+                                    </p:animEffect>
+                                  </p:childTnLst>
+                                </p:cTn>
+                              </p:par>
+                            </p:childTnLst>
+                          </p:cTn>
+                        </p:par>
+                        <p:par>
+                          <p:cTn id="8" fill="hold">
+                            <p:stCondLst>
+                              <p:cond delay="1000"/>
+                            </p:stCondLst>
+                            <p:childTnLst>
+                              <p:par>
+                                <p:cTn id="9" presetID="42" presetClass="path" presetSubtype="0" accel="50000" decel="50000" fill="hold" grpId="1" nodeType="afterEffect">
+                                  <p:stCondLst>
+                                    <p:cond delay="0"/>
+                                  </p:stCondLst>
+                                  <p:childTnLst>
+                                    <p:animMotion origin="layout" path="M 2.77778E-7 -4.76073E-6 L 0.15017 -4.76073E-6 " pathEditMode="relative" rAng="0" ptsTypes="AA">
+                                      <p:cBhvr>
+                                        <p:cTn id="10" dur="1000" fill="hold"/>
+                                        <p:tgtEl>
+                                          <p:spTgt spid="73"/>
+                                        </p:tgtEl>
+                                        <p:attrNameLst>
+                                          <p:attrName>ppt_x</p:attrName>
+                                          <p:attrName>ppt_y</p:attrName>
+                                        </p:attrNameLst>
+                                      </p:cBhvr>
+                                      <p:rCtr x="7500" y="0"/>
+                                    </p:animMotion>
+                                  </p:childTnLst>
+                                </p:cTn>
+                              </p:par>
+                            </p:childTnLst>
+                          </p:cTn>
+                        </p:par>
+                      </p:childTnLst>
+                    </p:cTn>
+                  </p:par>
+                  <p:par>
+                    <p:cTn id="11" fill="hold">
+                      <p:stCondLst>
+                        <p:cond delay="indefinite"/>
+                      </p:stCondLst>
+                      <p:childTnLst>
+                        <p:par>
+                          <p:cTn id="12" fill="hold">
+                            <p:stCondLst>
+                              <p:cond delay="0"/>
+                            </p:stCondLst>
+                            <p:childTnLst>
+                              <p:par>
+                                <p:cTn id="13" presetID="42" presetClass="path" presetSubtype="0" accel="50000" decel="50000" fill="hold" grpId="2" nodeType="clickEffect">
+                                  <p:stCondLst>
+                                    <p:cond delay="0"/>
+                                  </p:stCondLst>
+                                  <p:childTnLst>
+                                    <p:animMotion origin="layout" path="M 0.15017 -4.76073E-6 L 0.44184 0.02964 " pathEditMode="relative" rAng="0" ptsTypes="AA">
+                                      <p:cBhvr>
+                                        <p:cTn id="14" dur="1000" fill="hold"/>
+                                        <p:tgtEl>
+                                          <p:spTgt spid="73"/>
+                                        </p:tgtEl>
+                                        <p:attrNameLst>
+                                          <p:attrName>ppt_x</p:attrName>
+                                          <p:attrName>ppt_y</p:attrName>
+                                        </p:attrNameLst>
+                                      </p:cBhvr>
+                                      <p:rCtr x="14583" y="1482"/>
+                                    </p:animMotion>
+                                  </p:childTnLst>
+                                </p:cTn>
+                              </p:par>
+                              <p:par>
+                                <p:cTn id="15" presetID="10" presetClass="entr" presetSubtype="0" fill="hold" nodeType="withEffect">
+                                  <p:stCondLst>
+                                    <p:cond delay="0"/>
+                                  </p:stCondLst>
+                                  <p:childTnLst>
+                                    <p:set>
+                                      <p:cBhvr>
+                                        <p:cTn id="16" dur="1" fill="hold">
+                                          <p:stCondLst>
+                                            <p:cond delay="0"/>
+                                          </p:stCondLst>
+                                        </p:cTn>
+                                        <p:tgtEl>
+                                          <p:spTgt spid="28"/>
+                                        </p:tgtEl>
+                                        <p:attrNameLst>
+                                          <p:attrName>style.visibility</p:attrName>
+                                        </p:attrNameLst>
+                                      </p:cBhvr>
+                                      <p:to>
+                                        <p:strVal val="visible"/>
+                                      </p:to>
+                                    </p:set>
+                                    <p:animEffect transition="in" filter="fade">
+                                      <p:cBhvr>
+                                        <p:cTn id="17" dur="1000"/>
+                                        <p:tgtEl>
+                                          <p:spTgt spid="28"/>
+                                        </p:tgtEl>
+                                      </p:cBhvr>
+                                    </p:animEffect>
+                                  </p:childTnLst>
+                                </p:cTn>
+                              </p:par>
+                              <p:par>
+                                <p:cTn id="18" presetID="10" presetClass="entr" presetSubtype="0" fill="hold" grpId="0" nodeType="withEffect">
+                                  <p:stCondLst>
+                                    <p:cond delay="0"/>
+                                  </p:stCondLst>
+                                  <p:childTnLst>
+                                    <p:set>
+                                      <p:cBhvr>
+                                        <p:cTn id="19" dur="1" fill="hold">
+                                          <p:stCondLst>
+                                            <p:cond delay="0"/>
+                                          </p:stCondLst>
+                                        </p:cTn>
+                                        <p:tgtEl>
+                                          <p:spTgt spid="7"/>
+                                        </p:tgtEl>
+                                        <p:attrNameLst>
+                                          <p:attrName>style.visibility</p:attrName>
+                                        </p:attrNameLst>
+                                      </p:cBhvr>
+                                      <p:to>
+                                        <p:strVal val="visible"/>
+                                      </p:to>
+                                    </p:set>
+                                    <p:animEffect transition="in" filter="fade">
+                                      <p:cBhvr>
+                                        <p:cTn id="20" dur="1000"/>
+                                        <p:tgtEl>
+                                          <p:spTgt spid="7"/>
+                                        </p:tgtEl>
+                                      </p:cBhvr>
+                                    </p:animEffect>
+                                  </p:childTnLst>
+                                </p:cTn>
+                              </p:par>
+                              <p:par>
+                                <p:cTn id="21" presetID="10" presetClass="entr" presetSubtype="0" fill="hold" grpId="0" nodeType="withEffect">
+                                  <p:stCondLst>
+                                    <p:cond delay="0"/>
+                                  </p:stCondLst>
+                                  <p:childTnLst>
+                                    <p:set>
+                                      <p:cBhvr>
+                                        <p:cTn id="22" dur="1" fill="hold">
+                                          <p:stCondLst>
+                                            <p:cond delay="0"/>
+                                          </p:stCondLst>
+                                        </p:cTn>
+                                        <p:tgtEl>
+                                          <p:spTgt spid="6"/>
+                                        </p:tgtEl>
+                                        <p:attrNameLst>
+                                          <p:attrName>style.visibility</p:attrName>
+                                        </p:attrNameLst>
+                                      </p:cBhvr>
+                                      <p:to>
+                                        <p:strVal val="visible"/>
+                                      </p:to>
+                                    </p:set>
+                                    <p:animEffect transition="in" filter="fade">
+                                      <p:cBhvr>
+                                        <p:cTn id="23" dur="1000"/>
+                                        <p:tgtEl>
+                                          <p:spTgt spid="6"/>
+                                        </p:tgtEl>
+                                      </p:cBhvr>
+                                    </p:animEffect>
+                                  </p:childTnLst>
+                                </p:cTn>
+                              </p:par>
+                              <p:par>
+                                <p:cTn id="24" presetID="10" presetClass="entr" presetSubtype="0" fill="hold" grpId="0" nodeType="withEffect">
+                                  <p:stCondLst>
+                                    <p:cond delay="0"/>
+                                  </p:stCondLst>
+                                  <p:childTnLst>
+                                    <p:set>
+                                      <p:cBhvr>
+                                        <p:cTn id="25" dur="1" fill="hold">
+                                          <p:stCondLst>
+                                            <p:cond delay="0"/>
+                                          </p:stCondLst>
+                                        </p:cTn>
+                                        <p:tgtEl>
+                                          <p:spTgt spid="77"/>
+                                        </p:tgtEl>
+                                        <p:attrNameLst>
+                                          <p:attrName>style.visibility</p:attrName>
+                                        </p:attrNameLst>
+                                      </p:cBhvr>
+                                      <p:to>
+                                        <p:strVal val="visible"/>
+                                      </p:to>
+                                    </p:set>
+                                    <p:animEffect transition="in" filter="fade">
+                                      <p:cBhvr>
+                                        <p:cTn id="26" dur="1000"/>
+                                        <p:tgtEl>
+                                          <p:spTgt spid="77"/>
+                                        </p:tgtEl>
+                                      </p:cBhvr>
+                                    </p:animEffect>
+                                  </p:childTnLst>
+                                </p:cTn>
+                              </p:par>
+                              <p:par>
+                                <p:cTn id="27" presetID="10" presetClass="entr" presetSubtype="0" fill="hold" grpId="0" nodeType="withEffect">
+                                  <p:stCondLst>
+                                    <p:cond delay="0"/>
+                                  </p:stCondLst>
+                                  <p:childTnLst>
+                                    <p:set>
+                                      <p:cBhvr>
+                                        <p:cTn id="28" dur="1" fill="hold">
+                                          <p:stCondLst>
+                                            <p:cond delay="0"/>
+                                          </p:stCondLst>
+                                        </p:cTn>
+                                        <p:tgtEl>
+                                          <p:spTgt spid="74"/>
+                                        </p:tgtEl>
+                                        <p:attrNameLst>
+                                          <p:attrName>style.visibility</p:attrName>
+                                        </p:attrNameLst>
+                                      </p:cBhvr>
+                                      <p:to>
+                                        <p:strVal val="visible"/>
+                                      </p:to>
+                                    </p:set>
+                                    <p:animEffect transition="in" filter="fade">
+                                      <p:cBhvr>
+                                        <p:cTn id="29" dur="1000"/>
+                                        <p:tgtEl>
+                                          <p:spTgt spid="74"/>
+                                        </p:tgtEl>
+                                      </p:cBhvr>
+                                    </p:animEffect>
+                                  </p:childTnLst>
+                                </p:cTn>
+                              </p:par>
+                              <p:par>
+                                <p:cTn id="30" presetID="10" presetClass="entr" presetSubtype="0" fill="hold" grpId="0" nodeType="withEffect">
+                                  <p:stCondLst>
+                                    <p:cond delay="0"/>
+                                  </p:stCondLst>
+                                  <p:childTnLst>
+                                    <p:set>
+                                      <p:cBhvr>
+                                        <p:cTn id="31" dur="1" fill="hold">
+                                          <p:stCondLst>
+                                            <p:cond delay="0"/>
+                                          </p:stCondLst>
+                                        </p:cTn>
+                                        <p:tgtEl>
+                                          <p:spTgt spid="76"/>
+                                        </p:tgtEl>
+                                        <p:attrNameLst>
+                                          <p:attrName>style.visibility</p:attrName>
+                                        </p:attrNameLst>
+                                      </p:cBhvr>
+                                      <p:to>
+                                        <p:strVal val="visible"/>
+                                      </p:to>
+                                    </p:set>
+                                    <p:animEffect transition="in" filter="fade">
+                                      <p:cBhvr>
+                                        <p:cTn id="32" dur="1000"/>
+                                        <p:tgtEl>
+                                          <p:spTgt spid="76"/>
+                                        </p:tgtEl>
+                                      </p:cBhvr>
+                                    </p:animEffect>
+                                  </p:childTnLst>
+                                </p:cTn>
+                              </p:par>
+                              <p:par>
+                                <p:cTn id="33" presetID="10" presetClass="entr" presetSubtype="0" fill="hold" grpId="0" nodeType="withEffect">
+                                  <p:stCondLst>
+                                    <p:cond delay="0"/>
+                                  </p:stCondLst>
+                                  <p:childTnLst>
+                                    <p:set>
+                                      <p:cBhvr>
+                                        <p:cTn id="34" dur="1" fill="hold">
+                                          <p:stCondLst>
+                                            <p:cond delay="0"/>
+                                          </p:stCondLst>
+                                        </p:cTn>
+                                        <p:tgtEl>
+                                          <p:spTgt spid="75"/>
+                                        </p:tgtEl>
+                                        <p:attrNameLst>
+                                          <p:attrName>style.visibility</p:attrName>
+                                        </p:attrNameLst>
+                                      </p:cBhvr>
+                                      <p:to>
+                                        <p:strVal val="visible"/>
+                                      </p:to>
+                                    </p:set>
+                                    <p:animEffect transition="in" filter="fade">
+                                      <p:cBhvr>
+                                        <p:cTn id="35" dur="1000"/>
+                                        <p:tgtEl>
+                                          <p:spTgt spid="75"/>
+                                        </p:tgtEl>
+                                      </p:cBhvr>
+                                    </p:animEffect>
+                                  </p:childTnLst>
+                                </p:cTn>
+                              </p:par>
+                              <p:par>
+                                <p:cTn id="36" presetID="10" presetClass="entr" presetSubtype="0" fill="hold" grpId="0" nodeType="withEffect">
+                                  <p:stCondLst>
+                                    <p:cond delay="0"/>
+                                  </p:stCondLst>
+                                  <p:childTnLst>
+                                    <p:set>
+                                      <p:cBhvr>
+                                        <p:cTn id="37" dur="1" fill="hold">
+                                          <p:stCondLst>
+                                            <p:cond delay="0"/>
+                                          </p:stCondLst>
+                                        </p:cTn>
+                                        <p:tgtEl>
+                                          <p:spTgt spid="36"/>
+                                        </p:tgtEl>
+                                        <p:attrNameLst>
+                                          <p:attrName>style.visibility</p:attrName>
+                                        </p:attrNameLst>
+                                      </p:cBhvr>
+                                      <p:to>
+                                        <p:strVal val="visible"/>
+                                      </p:to>
+                                    </p:set>
+                                    <p:animEffect transition="in" filter="fade">
+                                      <p:cBhvr>
+                                        <p:cTn id="38" dur="1000"/>
+                                        <p:tgtEl>
+                                          <p:spTgt spid="36"/>
+                                        </p:tgtEl>
+                                      </p:cBhvr>
+                                    </p:animEffect>
+                                  </p:childTnLst>
+                                </p:cTn>
+                              </p:par>
+                            </p:childTnLst>
+                          </p:cTn>
+                        </p:par>
+                      </p:childTnLst>
+                    </p:cTn>
+                  </p:par>
+                  <p:par>
+                    <p:cTn id="39" fill="hold">
+                      <p:stCondLst>
+                        <p:cond delay="indefinite"/>
+                      </p:stCondLst>
+                      <p:childTnLst>
+                        <p:par>
+                          <p:cTn id="40" fill="hold">
+                            <p:stCondLst>
+                              <p:cond delay="0"/>
+                            </p:stCondLst>
+                            <p:childTnLst>
+                              <p:par>
+                                <p:cTn id="41" presetID="42" presetClass="path" presetSubtype="0" accel="50000" decel="50000" fill="hold" grpId="3" nodeType="clickEffect">
+                                  <p:stCondLst>
+                                    <p:cond delay="0"/>
+                                  </p:stCondLst>
+                                  <p:childTnLst>
+                                    <p:animMotion origin="layout" path="M 0.44184 0.02964 L 0.69184 -0.02963 " pathEditMode="relative" rAng="0" ptsTypes="AA">
+                                      <p:cBhvr>
+                                        <p:cTn id="42" dur="1000" fill="hold"/>
+                                        <p:tgtEl>
+                                          <p:spTgt spid="73"/>
+                                        </p:tgtEl>
+                                        <p:attrNameLst>
+                                          <p:attrName>ppt_x</p:attrName>
+                                          <p:attrName>ppt_y</p:attrName>
+                                        </p:attrNameLst>
+                                      </p:cBhvr>
+                                      <p:rCtr x="12500" y="-2964"/>
+                                    </p:animMotion>
+                                  </p:childTnLst>
+                                </p:cTn>
+                              </p:par>
+                              <p:par>
+                                <p:cTn id="43" presetID="10" presetClass="entr" presetSubtype="0" fill="hold" nodeType="withEffect">
+                                  <p:stCondLst>
+                                    <p:cond delay="0"/>
+                                  </p:stCondLst>
+                                  <p:childTnLst>
+                                    <p:set>
+                                      <p:cBhvr>
+                                        <p:cTn id="44" dur="1" fill="hold">
+                                          <p:stCondLst>
+                                            <p:cond delay="0"/>
+                                          </p:stCondLst>
+                                        </p:cTn>
+                                        <p:tgtEl>
+                                          <p:spTgt spid="30"/>
+                                        </p:tgtEl>
+                                        <p:attrNameLst>
+                                          <p:attrName>style.visibility</p:attrName>
+                                        </p:attrNameLst>
+                                      </p:cBhvr>
+                                      <p:to>
+                                        <p:strVal val="visible"/>
+                                      </p:to>
+                                    </p:set>
+                                    <p:animEffect transition="in" filter="fade">
+                                      <p:cBhvr>
+                                        <p:cTn id="45" dur="1000"/>
+                                        <p:tgtEl>
+                                          <p:spTgt spid="30"/>
+                                        </p:tgtEl>
+                                      </p:cBhvr>
+                                    </p:animEffect>
+                                  </p:childTnLst>
+                                </p:cTn>
+                              </p:par>
+                              <p:par>
+                                <p:cTn id="46" presetID="10" presetClass="entr" presetSubtype="0" fill="hold" grpId="0" nodeType="withEffect">
+                                  <p:stCondLst>
+                                    <p:cond delay="0"/>
+                                  </p:stCondLst>
+                                  <p:childTnLst>
+                                    <p:set>
+                                      <p:cBhvr>
+                                        <p:cTn id="47" dur="1" fill="hold">
+                                          <p:stCondLst>
+                                            <p:cond delay="0"/>
+                                          </p:stCondLst>
+                                        </p:cTn>
+                                        <p:tgtEl>
+                                          <p:spTgt spid="15"/>
+                                        </p:tgtEl>
+                                        <p:attrNameLst>
+                                          <p:attrName>style.visibility</p:attrName>
+                                        </p:attrNameLst>
+                                      </p:cBhvr>
+                                      <p:to>
+                                        <p:strVal val="visible"/>
+                                      </p:to>
+                                    </p:set>
+                                    <p:animEffect transition="in" filter="fade">
+                                      <p:cBhvr>
+                                        <p:cTn id="48" dur="1000"/>
+                                        <p:tgtEl>
+                                          <p:spTgt spid="15"/>
+                                        </p:tgtEl>
+                                      </p:cBhvr>
+                                    </p:animEffect>
+                                  </p:childTnLst>
+                                </p:cTn>
+                              </p:par>
+                              <p:par>
+                                <p:cTn id="49" presetID="10" presetClass="entr" presetSubtype="0" fill="hold" grpId="0" nodeType="withEffect">
+                                  <p:stCondLst>
+                                    <p:cond delay="0"/>
+                                  </p:stCondLst>
+                                  <p:childTnLst>
+                                    <p:set>
+                                      <p:cBhvr>
+                                        <p:cTn id="50" dur="1" fill="hold">
+                                          <p:stCondLst>
+                                            <p:cond delay="0"/>
+                                          </p:stCondLst>
+                                        </p:cTn>
+                                        <p:tgtEl>
+                                          <p:spTgt spid="37"/>
+                                        </p:tgtEl>
+                                        <p:attrNameLst>
+                                          <p:attrName>style.visibility</p:attrName>
+                                        </p:attrNameLst>
+                                      </p:cBhvr>
+                                      <p:to>
+                                        <p:strVal val="visible"/>
+                                      </p:to>
+                                    </p:set>
+                                    <p:animEffect transition="in" filter="fade">
+                                      <p:cBhvr>
+                                        <p:cTn id="51" dur="1000"/>
+                                        <p:tgtEl>
+                                          <p:spTgt spid="37"/>
+                                        </p:tgtEl>
+                                      </p:cBhvr>
+                                    </p:animEffect>
+                                  </p:childTnLst>
+                                </p:cTn>
+                              </p:par>
+                              <p:par>
+                                <p:cTn id="52" presetID="10" presetClass="entr" presetSubtype="0" fill="hold" grpId="0" nodeType="withEffect">
+                                  <p:stCondLst>
+                                    <p:cond delay="0"/>
+                                  </p:stCondLst>
+                                  <p:childTnLst>
+                                    <p:set>
+                                      <p:cBhvr>
+                                        <p:cTn id="53" dur="1" fill="hold">
+                                          <p:stCondLst>
+                                            <p:cond delay="0"/>
+                                          </p:stCondLst>
+                                        </p:cTn>
+                                        <p:tgtEl>
+                                          <p:spTgt spid="16"/>
+                                        </p:tgtEl>
+                                        <p:attrNameLst>
+                                          <p:attrName>style.visibility</p:attrName>
+                                        </p:attrNameLst>
+                                      </p:cBhvr>
+                                      <p:to>
+                                        <p:strVal val="visible"/>
+                                      </p:to>
+                                    </p:set>
+                                    <p:animEffect transition="in" filter="fade">
+                                      <p:cBhvr>
+                                        <p:cTn id="54" dur="1000"/>
+                                        <p:tgtEl>
+                                          <p:spTgt spid="16"/>
+                                        </p:tgtEl>
+                                      </p:cBhvr>
+                                    </p:animEffect>
+                                  </p:childTnLst>
+                                </p:cTn>
+                              </p:par>
+                            </p:childTnLst>
+                          </p:cTn>
+                        </p:par>
+                      </p:childTnLst>
+                    </p:cTn>
+                  </p:par>
+                  <p:par>
+                    <p:cTn id="55" fill="hold">
+                      <p:stCondLst>
+                        <p:cond delay="indefinite"/>
+                      </p:stCondLst>
+                      <p:childTnLst>
+                        <p:par>
+                          <p:cTn id="56" fill="hold">
+                            <p:stCondLst>
+                              <p:cond delay="0"/>
+                            </p:stCondLst>
+                            <p:childTnLst>
+                              <p:par>
+                                <p:cTn id="57" presetID="42" presetClass="path" presetSubtype="0" accel="50000" decel="50000" fill="hold" grpId="4" nodeType="clickEffect">
+                                  <p:stCondLst>
+                                    <p:cond delay="0"/>
+                                  </p:stCondLst>
+                                  <p:childTnLst>
+                                    <p:animMotion origin="layout" path="M 0.69184 -0.02963 L 0.15851 0.48904 " pathEditMode="relative" rAng="0" ptsTypes="AA">
+                                      <p:cBhvr>
+                                        <p:cTn id="58" dur="1000" fill="hold"/>
+                                        <p:tgtEl>
+                                          <p:spTgt spid="73"/>
+                                        </p:tgtEl>
+                                        <p:attrNameLst>
+                                          <p:attrName>ppt_x</p:attrName>
+                                          <p:attrName>ppt_y</p:attrName>
+                                        </p:attrNameLst>
+                                      </p:cBhvr>
+                                      <p:rCtr x="-26667" y="25934"/>
+                                    </p:animMotion>
+                                  </p:childTnLst>
+                                </p:cTn>
+                              </p:par>
+                              <p:par>
+                                <p:cTn id="59" presetID="10" presetClass="entr" presetSubtype="0" fill="hold" grpId="0" nodeType="withEffect">
+                                  <p:stCondLst>
+                                    <p:cond delay="0"/>
+                                  </p:stCondLst>
+                                  <p:childTnLst>
+                                    <p:set>
+                                      <p:cBhvr>
+                                        <p:cTn id="60" dur="1" fill="hold">
+                                          <p:stCondLst>
+                                            <p:cond delay="0"/>
+                                          </p:stCondLst>
+                                        </p:cTn>
+                                        <p:tgtEl>
+                                          <p:spTgt spid="18"/>
+                                        </p:tgtEl>
+                                        <p:attrNameLst>
+                                          <p:attrName>style.visibility</p:attrName>
+                                        </p:attrNameLst>
+                                      </p:cBhvr>
+                                      <p:to>
+                                        <p:strVal val="visible"/>
+                                      </p:to>
+                                    </p:set>
+                                    <p:animEffect transition="in" filter="fade">
+                                      <p:cBhvr>
+                                        <p:cTn id="61" dur="1000"/>
+                                        <p:tgtEl>
+                                          <p:spTgt spid="18"/>
+                                        </p:tgtEl>
+                                      </p:cBhvr>
+                                    </p:animEffect>
+                                  </p:childTnLst>
+                                </p:cTn>
+                              </p:par>
+                              <p:par>
+                                <p:cTn id="62" presetID="10" presetClass="entr" presetSubtype="0" fill="hold" grpId="0" nodeType="withEffect">
+                                  <p:stCondLst>
+                                    <p:cond delay="0"/>
+                                  </p:stCondLst>
+                                  <p:childTnLst>
+                                    <p:set>
+                                      <p:cBhvr>
+                                        <p:cTn id="63" dur="1" fill="hold">
+                                          <p:stCondLst>
+                                            <p:cond delay="0"/>
+                                          </p:stCondLst>
+                                        </p:cTn>
+                                        <p:tgtEl>
+                                          <p:spTgt spid="38"/>
+                                        </p:tgtEl>
+                                        <p:attrNameLst>
+                                          <p:attrName>style.visibility</p:attrName>
+                                        </p:attrNameLst>
+                                      </p:cBhvr>
+                                      <p:to>
+                                        <p:strVal val="visible"/>
+                                      </p:to>
+                                    </p:set>
+                                    <p:animEffect transition="in" filter="fade">
+                                      <p:cBhvr>
+                                        <p:cTn id="64" dur="1000"/>
+                                        <p:tgtEl>
+                                          <p:spTgt spid="38"/>
+                                        </p:tgtEl>
+                                      </p:cBhvr>
+                                    </p:animEffect>
+                                  </p:childTnLst>
+                                </p:cTn>
+                              </p:par>
+                              <p:par>
+                                <p:cTn id="65" presetID="42" presetClass="path" presetSubtype="0" accel="50000" decel="50000" fill="hold" grpId="1" nodeType="withEffect">
+                                  <p:stCondLst>
+                                    <p:cond delay="0"/>
+                                  </p:stCondLst>
+                                  <p:childTnLst>
+                                    <p:animMotion origin="layout" path="M 3.05556E-6 -2.09324E-6 L 0.23524 -0.00339 " pathEditMode="relative" rAng="0" ptsTypes="AA">
+                                      <p:cBhvr>
+                                        <p:cTn id="66" dur="1000" fill="hold"/>
+                                        <p:tgtEl>
+                                          <p:spTgt spid="76"/>
+                                        </p:tgtEl>
+                                        <p:attrNameLst>
+                                          <p:attrName>ppt_x</p:attrName>
+                                          <p:attrName>ppt_y</p:attrName>
+                                        </p:attrNameLst>
+                                      </p:cBhvr>
+                                      <p:rCtr x="11753" y="-185"/>
+                                    </p:animMotion>
+                                  </p:childTnLst>
+                                </p:cTn>
+                              </p:par>
+                              <p:par>
+                                <p:cTn id="67" presetID="19" presetClass="emph" presetSubtype="0" fill="hold" grpId="7" nodeType="withEffect">
+                                  <p:stCondLst>
+                                    <p:cond delay="0"/>
+                                  </p:stCondLst>
+                                  <p:childTnLst>
+                                    <p:animClr clrSpc="rgb" dir="cw">
+                                      <p:cBhvr override="childStyle">
+                                        <p:cTn id="68" dur="1000" fill="hold"/>
+                                        <p:tgtEl>
+                                          <p:spTgt spid="73"/>
+                                        </p:tgtEl>
+                                        <p:attrNameLst>
+                                          <p:attrName>style.color</p:attrName>
+                                        </p:attrNameLst>
+                                      </p:cBhvr>
+                                      <p:to>
+                                        <a:schemeClr val="accent2"/>
+                                      </p:to>
+                                    </p:animClr>
+                                    <p:animClr clrSpc="rgb" dir="cw">
+                                      <p:cBhvr>
+                                        <p:cTn id="69" dur="1000" fill="hold"/>
+                                        <p:tgtEl>
+                                          <p:spTgt spid="73"/>
+                                        </p:tgtEl>
+                                        <p:attrNameLst>
+                                          <p:attrName>fillcolor</p:attrName>
+                                        </p:attrNameLst>
+                                      </p:cBhvr>
+                                      <p:to>
+                                        <a:schemeClr val="accent2"/>
+                                      </p:to>
+                                    </p:animClr>
+                                    <p:set>
+                                      <p:cBhvr>
+                                        <p:cTn id="70" dur="1000" fill="hold"/>
+                                        <p:tgtEl>
+                                          <p:spTgt spid="73"/>
+                                        </p:tgtEl>
+                                        <p:attrNameLst>
+                                          <p:attrName>fill.type</p:attrName>
+                                        </p:attrNameLst>
+                                      </p:cBhvr>
+                                      <p:to>
+                                        <p:strVal val="solid"/>
+                                      </p:to>
+                                    </p:set>
+                                    <p:set>
+                                      <p:cBhvr>
+                                        <p:cTn id="71" dur="1000" fill="hold"/>
+                                        <p:tgtEl>
+                                          <p:spTgt spid="73"/>
+                                        </p:tgtEl>
+                                        <p:attrNameLst>
+                                          <p:attrName>fill.on</p:attrName>
+                                        </p:attrNameLst>
+                                      </p:cBhvr>
+                                      <p:to>
+                                        <p:strVal val="true"/>
+                                      </p:to>
+                                    </p:set>
+                                  </p:childTnLst>
+                                </p:cTn>
+                              </p:par>
+                            </p:childTnLst>
+                          </p:cTn>
+                        </p:par>
+                      </p:childTnLst>
+                    </p:cTn>
+                  </p:par>
+                  <p:par>
+                    <p:cTn id="72" fill="hold">
+                      <p:stCondLst>
+                        <p:cond delay="indefinite"/>
+                      </p:stCondLst>
+                      <p:childTnLst>
+                        <p:par>
+                          <p:cTn id="73" fill="hold">
+                            <p:stCondLst>
+                              <p:cond delay="0"/>
+                            </p:stCondLst>
+                            <p:childTnLst>
+                              <p:par>
+                                <p:cTn id="74" presetID="42" presetClass="path" presetSubtype="0" accel="50000" decel="50000" fill="hold" grpId="5" nodeType="clickEffect">
+                                  <p:stCondLst>
+                                    <p:cond delay="0"/>
+                                  </p:stCondLst>
+                                  <p:childTnLst>
+                                    <p:animMotion origin="layout" path="M 0.15851 0.48904 L 0.44184 0.5335 " pathEditMode="relative" rAng="0" ptsTypes="AA">
+                                      <p:cBhvr>
+                                        <p:cTn id="75" dur="1000" fill="hold"/>
+                                        <p:tgtEl>
+                                          <p:spTgt spid="73"/>
+                                        </p:tgtEl>
+                                        <p:attrNameLst>
+                                          <p:attrName>ppt_x</p:attrName>
+                                          <p:attrName>ppt_y</p:attrName>
+                                        </p:attrNameLst>
+                                      </p:cBhvr>
+                                      <p:rCtr x="14167" y="2223"/>
+                                    </p:animMotion>
+                                  </p:childTnLst>
+                                </p:cTn>
+                              </p:par>
+                              <p:par>
+                                <p:cTn id="76" presetID="10" presetClass="entr" presetSubtype="0" fill="hold" nodeType="withEffect">
+                                  <p:stCondLst>
+                                    <p:cond delay="0"/>
+                                  </p:stCondLst>
+                                  <p:childTnLst>
+                                    <p:set>
+                                      <p:cBhvr>
+                                        <p:cTn id="77" dur="1" fill="hold">
+                                          <p:stCondLst>
+                                            <p:cond delay="0"/>
+                                          </p:stCondLst>
+                                        </p:cTn>
+                                        <p:tgtEl>
+                                          <p:spTgt spid="32"/>
+                                        </p:tgtEl>
+                                        <p:attrNameLst>
+                                          <p:attrName>style.visibility</p:attrName>
+                                        </p:attrNameLst>
+                                      </p:cBhvr>
+                                      <p:to>
+                                        <p:strVal val="visible"/>
+                                      </p:to>
+                                    </p:set>
+                                    <p:animEffect transition="in" filter="fade">
+                                      <p:cBhvr>
+                                        <p:cTn id="78" dur="1000"/>
+                                        <p:tgtEl>
+                                          <p:spTgt spid="32"/>
+                                        </p:tgtEl>
+                                      </p:cBhvr>
+                                    </p:animEffect>
+                                  </p:childTnLst>
+                                </p:cTn>
+                              </p:par>
+                              <p:par>
+                                <p:cTn id="79" presetID="10" presetClass="entr" presetSubtype="0" fill="hold" grpId="0" nodeType="withEffect">
+                                  <p:stCondLst>
+                                    <p:cond delay="0"/>
+                                  </p:stCondLst>
+                                  <p:childTnLst>
+                                    <p:set>
+                                      <p:cBhvr>
+                                        <p:cTn id="80" dur="1" fill="hold">
+                                          <p:stCondLst>
+                                            <p:cond delay="0"/>
+                                          </p:stCondLst>
+                                        </p:cTn>
+                                        <p:tgtEl>
+                                          <p:spTgt spid="19"/>
+                                        </p:tgtEl>
+                                        <p:attrNameLst>
+                                          <p:attrName>style.visibility</p:attrName>
+                                        </p:attrNameLst>
+                                      </p:cBhvr>
+                                      <p:to>
+                                        <p:strVal val="visible"/>
+                                      </p:to>
+                                    </p:set>
+                                    <p:animEffect transition="in" filter="fade">
+                                      <p:cBhvr>
+                                        <p:cTn id="81" dur="1000"/>
+                                        <p:tgtEl>
+                                          <p:spTgt spid="19"/>
+                                        </p:tgtEl>
+                                      </p:cBhvr>
+                                    </p:animEffect>
+                                  </p:childTnLst>
+                                </p:cTn>
+                              </p:par>
+                              <p:par>
+                                <p:cTn id="82" presetID="10" presetClass="entr" presetSubtype="0" fill="hold" grpId="0" nodeType="withEffect">
+                                  <p:stCondLst>
+                                    <p:cond delay="0"/>
+                                  </p:stCondLst>
+                                  <p:childTnLst>
+                                    <p:set>
+                                      <p:cBhvr>
+                                        <p:cTn id="83" dur="1" fill="hold">
+                                          <p:stCondLst>
+                                            <p:cond delay="0"/>
+                                          </p:stCondLst>
+                                        </p:cTn>
+                                        <p:tgtEl>
+                                          <p:spTgt spid="39"/>
+                                        </p:tgtEl>
+                                        <p:attrNameLst>
+                                          <p:attrName>style.visibility</p:attrName>
+                                        </p:attrNameLst>
+                                      </p:cBhvr>
+                                      <p:to>
+                                        <p:strVal val="visible"/>
+                                      </p:to>
+                                    </p:set>
+                                    <p:animEffect transition="in" filter="fade">
+                                      <p:cBhvr>
+                                        <p:cTn id="84" dur="1000"/>
+                                        <p:tgtEl>
+                                          <p:spTgt spid="39"/>
+                                        </p:tgtEl>
+                                      </p:cBhvr>
+                                    </p:animEffect>
+                                  </p:childTnLst>
+                                </p:cTn>
+                              </p:par>
+                              <p:par>
+                                <p:cTn id="85" presetID="10" presetClass="entr" presetSubtype="0" fill="hold" grpId="0" nodeType="withEffect">
+                                  <p:stCondLst>
+                                    <p:cond delay="0"/>
+                                  </p:stCondLst>
+                                  <p:childTnLst>
+                                    <p:set>
+                                      <p:cBhvr>
+                                        <p:cTn id="86" dur="1" fill="hold">
+                                          <p:stCondLst>
+                                            <p:cond delay="0"/>
+                                          </p:stCondLst>
+                                        </p:cTn>
+                                        <p:tgtEl>
+                                          <p:spTgt spid="81"/>
+                                        </p:tgtEl>
+                                        <p:attrNameLst>
+                                          <p:attrName>style.visibility</p:attrName>
+                                        </p:attrNameLst>
+                                      </p:cBhvr>
+                                      <p:to>
+                                        <p:strVal val="visible"/>
+                                      </p:to>
+                                    </p:set>
+                                    <p:animEffect transition="in" filter="fade">
+                                      <p:cBhvr>
+                                        <p:cTn id="87" dur="1000"/>
+                                        <p:tgtEl>
+                                          <p:spTgt spid="81"/>
+                                        </p:tgtEl>
+                                      </p:cBhvr>
+                                    </p:animEffect>
+                                  </p:childTnLst>
+                                </p:cTn>
+                              </p:par>
+                              <p:par>
+                                <p:cTn id="88" presetID="10" presetClass="entr" presetSubtype="0" fill="hold" grpId="0" nodeType="withEffect">
+                                  <p:stCondLst>
+                                    <p:cond delay="0"/>
+                                  </p:stCondLst>
+                                  <p:childTnLst>
+                                    <p:set>
+                                      <p:cBhvr>
+                                        <p:cTn id="89" dur="1" fill="hold">
+                                          <p:stCondLst>
+                                            <p:cond delay="0"/>
+                                          </p:stCondLst>
+                                        </p:cTn>
+                                        <p:tgtEl>
+                                          <p:spTgt spid="79"/>
+                                        </p:tgtEl>
+                                        <p:attrNameLst>
+                                          <p:attrName>style.visibility</p:attrName>
+                                        </p:attrNameLst>
+                                      </p:cBhvr>
+                                      <p:to>
+                                        <p:strVal val="visible"/>
+                                      </p:to>
+                                    </p:set>
+                                    <p:animEffect transition="in" filter="fade">
+                                      <p:cBhvr>
+                                        <p:cTn id="90" dur="1000"/>
+                                        <p:tgtEl>
+                                          <p:spTgt spid="79"/>
+                                        </p:tgtEl>
+                                      </p:cBhvr>
+                                    </p:animEffect>
+                                  </p:childTnLst>
+                                </p:cTn>
+                              </p:par>
+                              <p:par>
+                                <p:cTn id="91" presetID="10" presetClass="entr" presetSubtype="0" fill="hold" grpId="0" nodeType="withEffect">
+                                  <p:stCondLst>
+                                    <p:cond delay="0"/>
+                                  </p:stCondLst>
+                                  <p:childTnLst>
+                                    <p:set>
+                                      <p:cBhvr>
+                                        <p:cTn id="92" dur="1" fill="hold">
+                                          <p:stCondLst>
+                                            <p:cond delay="0"/>
+                                          </p:stCondLst>
+                                        </p:cTn>
+                                        <p:tgtEl>
+                                          <p:spTgt spid="80"/>
+                                        </p:tgtEl>
+                                        <p:attrNameLst>
+                                          <p:attrName>style.visibility</p:attrName>
+                                        </p:attrNameLst>
+                                      </p:cBhvr>
+                                      <p:to>
+                                        <p:strVal val="visible"/>
+                                      </p:to>
+                                    </p:set>
+                                    <p:animEffect transition="in" filter="fade">
+                                      <p:cBhvr>
+                                        <p:cTn id="93" dur="1000"/>
+                                        <p:tgtEl>
+                                          <p:spTgt spid="80"/>
+                                        </p:tgtEl>
+                                      </p:cBhvr>
+                                    </p:animEffect>
+                                  </p:childTnLst>
+                                </p:cTn>
+                              </p:par>
+                              <p:par>
+                                <p:cTn id="94" presetID="10" presetClass="entr" presetSubtype="0" fill="hold" grpId="0" nodeType="withEffect">
+                                  <p:stCondLst>
+                                    <p:cond delay="0"/>
+                                  </p:stCondLst>
+                                  <p:childTnLst>
+                                    <p:set>
+                                      <p:cBhvr>
+                                        <p:cTn id="95" dur="1" fill="hold">
+                                          <p:stCondLst>
+                                            <p:cond delay="0"/>
+                                          </p:stCondLst>
+                                        </p:cTn>
+                                        <p:tgtEl>
+                                          <p:spTgt spid="78"/>
+                                        </p:tgtEl>
+                                        <p:attrNameLst>
+                                          <p:attrName>style.visibility</p:attrName>
+                                        </p:attrNameLst>
+                                      </p:cBhvr>
+                                      <p:to>
+                                        <p:strVal val="visible"/>
+                                      </p:to>
+                                    </p:set>
+                                    <p:animEffect transition="in" filter="fade">
+                                      <p:cBhvr>
+                                        <p:cTn id="96" dur="1000"/>
+                                        <p:tgtEl>
+                                          <p:spTgt spid="78"/>
+                                        </p:tgtEl>
+                                      </p:cBhvr>
+                                    </p:animEffect>
+                                  </p:childTnLst>
+                                </p:cTn>
+                              </p:par>
+                            </p:childTnLst>
+                          </p:cTn>
+                        </p:par>
+                      </p:childTnLst>
+                    </p:cTn>
+                  </p:par>
+                  <p:par>
+                    <p:cTn id="97" fill="hold">
+                      <p:stCondLst>
+                        <p:cond delay="indefinite"/>
+                      </p:stCondLst>
+                      <p:childTnLst>
+                        <p:par>
+                          <p:cTn id="98" fill="hold">
+                            <p:stCondLst>
+                              <p:cond delay="0"/>
+                            </p:stCondLst>
+                            <p:childTnLst>
+                              <p:par>
+                                <p:cTn id="99" presetID="42" presetClass="path" presetSubtype="0" accel="50000" decel="50000" fill="hold" grpId="6" nodeType="clickEffect">
+                                  <p:stCondLst>
+                                    <p:cond delay="0"/>
+                                  </p:stCondLst>
+                                  <p:childTnLst>
+                                    <p:animMotion origin="layout" path="M 0.44184 0.5335 L 0.69184 0.48904 " pathEditMode="relative" rAng="0" ptsTypes="AA">
+                                      <p:cBhvr>
+                                        <p:cTn id="100" dur="1000" fill="hold"/>
+                                        <p:tgtEl>
+                                          <p:spTgt spid="73"/>
+                                        </p:tgtEl>
+                                        <p:attrNameLst>
+                                          <p:attrName>ppt_x</p:attrName>
+                                          <p:attrName>ppt_y</p:attrName>
+                                        </p:attrNameLst>
+                                      </p:cBhvr>
+                                      <p:rCtr x="12500" y="-2223"/>
+                                    </p:animMotion>
+                                  </p:childTnLst>
+                                </p:cTn>
+                              </p:par>
+                              <p:par>
+                                <p:cTn id="101" presetID="10" presetClass="entr" presetSubtype="0" fill="hold" grpId="0" nodeType="withEffect">
+                                  <p:stCondLst>
+                                    <p:cond delay="0"/>
+                                  </p:stCondLst>
+                                  <p:childTnLst>
+                                    <p:set>
+                                      <p:cBhvr>
+                                        <p:cTn id="102" dur="1" fill="hold">
+                                          <p:stCondLst>
+                                            <p:cond delay="0"/>
+                                          </p:stCondLst>
+                                        </p:cTn>
+                                        <p:tgtEl>
+                                          <p:spTgt spid="24"/>
+                                        </p:tgtEl>
+                                        <p:attrNameLst>
+                                          <p:attrName>style.visibility</p:attrName>
+                                        </p:attrNameLst>
+                                      </p:cBhvr>
+                                      <p:to>
+                                        <p:strVal val="visible"/>
+                                      </p:to>
+                                    </p:set>
+                                    <p:animEffect transition="in" filter="fade">
+                                      <p:cBhvr>
+                                        <p:cTn id="103" dur="1000"/>
+                                        <p:tgtEl>
+                                          <p:spTgt spid="24"/>
+                                        </p:tgtEl>
+                                      </p:cBhvr>
+                                    </p:animEffect>
+                                  </p:childTnLst>
+                                </p:cTn>
+                              </p:par>
+                              <p:par>
+                                <p:cTn id="104" presetID="10" presetClass="entr" presetSubtype="0" fill="hold" grpId="0" nodeType="withEffect">
+                                  <p:stCondLst>
+                                    <p:cond delay="0"/>
+                                  </p:stCondLst>
+                                  <p:childTnLst>
+                                    <p:set>
+                                      <p:cBhvr>
+                                        <p:cTn id="105" dur="1" fill="hold">
+                                          <p:stCondLst>
+                                            <p:cond delay="0"/>
+                                          </p:stCondLst>
+                                        </p:cTn>
+                                        <p:tgtEl>
+                                          <p:spTgt spid="40"/>
+                                        </p:tgtEl>
+                                        <p:attrNameLst>
+                                          <p:attrName>style.visibility</p:attrName>
+                                        </p:attrNameLst>
+                                      </p:cBhvr>
+                                      <p:to>
+                                        <p:strVal val="visible"/>
+                                      </p:to>
+                                    </p:set>
+                                    <p:animEffect transition="in" filter="fade">
+                                      <p:cBhvr>
+                                        <p:cTn id="106" dur="1000"/>
+                                        <p:tgtEl>
+                                          <p:spTgt spid="40"/>
+                                        </p:tgtEl>
+                                      </p:cBhvr>
+                                    </p:animEffect>
+                                  </p:childTnLst>
+                                </p:cTn>
+                              </p:par>
+                              <p:par>
+                                <p:cTn id="107" presetID="10" presetClass="entr" presetSubtype="0" fill="hold" grpId="0" nodeType="withEffect">
+                                  <p:stCondLst>
+                                    <p:cond delay="0"/>
+                                  </p:stCondLst>
+                                  <p:childTnLst>
+                                    <p:set>
+                                      <p:cBhvr>
+                                        <p:cTn id="108" dur="1" fill="hold">
+                                          <p:stCondLst>
+                                            <p:cond delay="0"/>
+                                          </p:stCondLst>
+                                        </p:cTn>
+                                        <p:tgtEl>
+                                          <p:spTgt spid="23"/>
+                                        </p:tgtEl>
+                                        <p:attrNameLst>
+                                          <p:attrName>style.visibility</p:attrName>
+                                        </p:attrNameLst>
+                                      </p:cBhvr>
+                                      <p:to>
+                                        <p:strVal val="visible"/>
+                                      </p:to>
+                                    </p:set>
+                                    <p:animEffect transition="in" filter="fade">
+                                      <p:cBhvr>
+                                        <p:cTn id="109" dur="1000"/>
+                                        <p:tgtEl>
+                                          <p:spTgt spid="23"/>
+                                        </p:tgtEl>
+                                      </p:cBhvr>
+                                    </p:animEffect>
+                                  </p:childTnLst>
+                                </p:cTn>
+                              </p:par>
+                              <p:par>
+                                <p:cTn id="110" presetID="10" presetClass="entr" presetSubtype="0" fill="hold" nodeType="withEffect">
+                                  <p:stCondLst>
+                                    <p:cond delay="0"/>
+                                  </p:stCondLst>
+                                  <p:childTnLst>
+                                    <p:set>
+                                      <p:cBhvr>
+                                        <p:cTn id="111" dur="1" fill="hold">
+                                          <p:stCondLst>
+                                            <p:cond delay="0"/>
+                                          </p:stCondLst>
+                                        </p:cTn>
+                                        <p:tgtEl>
+                                          <p:spTgt spid="33"/>
+                                        </p:tgtEl>
+                                        <p:attrNameLst>
+                                          <p:attrName>style.visibility</p:attrName>
+                                        </p:attrNameLst>
+                                      </p:cBhvr>
+                                      <p:to>
+                                        <p:strVal val="visible"/>
+                                      </p:to>
+                                    </p:set>
+                                    <p:animEffect transition="in" filter="fade">
+                                      <p:cBhvr>
+                                        <p:cTn id="112" dur="1000"/>
+                                        <p:tgtEl>
+                                          <p:spTgt spid="33"/>
+                                        </p:tgtEl>
+                                      </p:cBhvr>
+                                    </p:animEffect>
+                                  </p:childTnLst>
+                                </p:cTn>
+                              </p:par>
+                            </p:childTnLst>
+                          </p:cTn>
+                        </p:par>
+                      </p:childTnLst>
+                    </p:cTn>
+                  </p:par>
+                </p:childTnLst>
+              </p:cTn>
+              <p:prevCondLst>
+                <p:cond evt="onPrev" delay="0">
+                  <p:tgtEl>
+                    <p:sldTgt/>
+                  </p:tgtEl>
+                </p:cond>
+              </p:prevCondLst>
+              <p:nextCondLst>
+                <p:cond evt="onNext" delay="0">
+                  <p:tgtEl>
+                    <p:sldTgt/>
+                  </p:tgtEl>
+                </p:cond>
+              </p:nextCondLst>
+            </p:seq>
+          </p:childTnLst>
+        </p:cTn>
       </p:par>
     </p:tnLst>
+    <p:bldLst>
+      <p:bldP spid="6" grpId="0" animBg="1"/>
+      <p:bldP spid="7" grpId="0" animBg="1"/>
+      <p:bldP spid="15" grpId="0" animBg="1"/>
+      <p:bldP spid="16" grpId="0" animBg="1"/>
+      <p:bldP spid="18" grpId="0" animBg="1"/>
+      <p:bldP spid="19" grpId="0" animBg="1"/>
+      <p:bldP spid="23" grpId="0" animBg="1"/>
+      <p:bldP spid="24" grpId="0" animBg="1"/>
+      <p:bldP spid="36" grpId="0"/>
+      <p:bldP spid="37" grpId="0"/>
+      <p:bldP spid="38" grpId="0"/>
+      <p:bldP spid="39" grpId="0"/>
+      <p:bldP spid="40" grpId="0"/>
+      <p:bldP spid="73" grpId="0" animBg="1"/>
+      <p:bldP spid="73" grpId="1" animBg="1"/>
+      <p:bldP spid="73" grpId="2" animBg="1"/>
+      <p:bldP spid="73" grpId="3" animBg="1"/>
+      <p:bldP spid="73" grpId="4" animBg="1"/>
+      <p:bldP spid="73" grpId="5" animBg="1"/>
+      <p:bldP spid="73" grpId="6" animBg="1"/>
+      <p:bldP spid="73" grpId="7" animBg="1"/>
+      <p:bldP spid="74" grpId="0" animBg="1"/>
+      <p:bldP spid="75" grpId="0" animBg="1"/>
+      <p:bldP spid="76" grpId="0" animBg="1"/>
+      <p:bldP spid="76" grpId="1" animBg="1"/>
+      <p:bldP spid="77" grpId="0" animBg="1"/>
+      <p:bldP spid="78" grpId="0" animBg="1"/>
+      <p:bldP spid="79" grpId="0" animBg="1"/>
+      <p:bldP spid="80" grpId="0" animBg="1"/>
+      <p:bldP spid="81" grpId="0" animBg="1"/>
+    </p:bldLst>
   </p:timing>
 </p:sld>
 </file>
@@ -4513,16 +6774,14 @@
         </p:nvSpPr>
         <p:spPr/>
         <p:txBody>
-          <a:bodyPr/>
-          <a:lstStyle/>
-          <a:p>
-            <a:r>
-              <a:rPr lang="en-US" dirty="0" smtClean="0"/>
-              <a:t>ASP.NET </a:t>
-            </a:r>
-            <a:r>
-              <a:rPr lang="en-US" dirty="0" smtClean="0"/>
-              <a:t>Threading Model</a:t>
+          <a:bodyPr>
+            <a:normAutofit/>
+          </a:bodyPr>
+          <a:lstStyle/>
+          <a:p>
+            <a:r>
+              <a:rPr lang="en-US" dirty="0" smtClean="0"/>
+              <a:t>Threads are Shared Resources</a:t>
             </a:r>
             <a:endParaRPr lang="en-US" dirty="0"/>
           </a:p>
@@ -4541,60 +6800,37 @@
         <p:spPr/>
         <p:txBody>
           <a:bodyPr>
-            <a:normAutofit fontScale="70000" lnSpcReduction="20000"/>
+            <a:normAutofit/>
           </a:bodyPr>
           <a:lstStyle/>
           <a:p>
             <a:r>
               <a:rPr lang="en-US" dirty="0" smtClean="0"/>
-              <a:t>Thread fetched from CLR thread pool and used to process request</a:t>
-            </a:r>
-          </a:p>
-          <a:p>
-            <a:pPr lvl="1"/>
-            <a:r>
-              <a:rPr lang="en-US" dirty="0" smtClean="0"/>
-              <a:t>Synchronous: one logical thread per request</a:t>
-            </a:r>
-          </a:p>
-          <a:p>
+              <a:t>Blocked threads are wasteful</a:t>
+            </a:r>
             <a:endParaRPr lang="en-US" dirty="0"/>
           </a:p>
           <a:p>
             <a:r>
-              <a:rPr lang="en-US" dirty="0" smtClean="0"/>
-              <a:t>But this doesn’t scale!</a:t>
-            </a:r>
-          </a:p>
-          <a:p>
-            <a:pPr lvl="1"/>
-            <a:r>
-              <a:rPr lang="en-US" dirty="0" smtClean="0"/>
-              <a:t>Threads consume memory and resources</a:t>
-            </a:r>
-          </a:p>
-          <a:p>
-            <a:pPr lvl="1"/>
-            <a:r>
-              <a:rPr lang="en-US" dirty="0" smtClean="0"/>
-              <a:t>CLR thread pool contains only finite number of threads</a:t>
-            </a:r>
-          </a:p>
-          <a:p>
-            <a:endParaRPr lang="en-US" dirty="0"/>
-          </a:p>
-          <a:p>
-            <a:r>
-              <a:rPr lang="en-US" dirty="0" smtClean="0"/>
-              <a:t>Overall goal is to make sure that if a thread has been pulled from the thread pool, it is doing useful work</a:t>
-            </a:r>
+              <a:rPr lang="en-US" dirty="0" err="1" smtClean="0"/>
+              <a:t>Async</a:t>
+            </a:r>
+            <a:r>
+              <a:rPr lang="en-US" dirty="0" smtClean="0"/>
+              <a:t> code allows threads to process work items in the CLR thread pool more efficiently</a:t>
+            </a:r>
+            <a:endParaRPr lang="en-US" dirty="0" smtClean="0">
+              <a:solidFill>
+                <a:srgbClr val="FF0000"/>
+              </a:solidFill>
+            </a:endParaRPr>
           </a:p>
         </p:txBody>
       </p:sp>
     </p:spTree>
     <p:extLst>
       <p:ext uri="{BB962C8B-B14F-4D97-AF65-F5344CB8AC3E}">
-        <p14:creationId xmlns:p14="http://schemas.microsoft.com/office/powerpoint/2010/main" val="3748785479"/>
+        <p14:creationId xmlns:p14="http://schemas.microsoft.com/office/powerpoint/2010/main" val="1003157574"/>
       </p:ext>
     </p:extLst>
   </p:cSld>
@@ -4645,7 +6881,15 @@
           <a:p>
             <a:r>
               <a:rPr lang="en-US" dirty="0" smtClean="0"/>
-              <a:t>ASP.NET threading model</a:t>
+              <a:t>ASP.NET </a:t>
+            </a:r>
+            <a:r>
+              <a:rPr lang="en-US" dirty="0" err="1" smtClean="0"/>
+              <a:t>Async</a:t>
+            </a:r>
+            <a:r>
+              <a:rPr lang="en-US" dirty="0" smtClean="0"/>
+              <a:t> Points</a:t>
             </a:r>
             <a:endParaRPr lang="en-US" dirty="0"/>
           </a:p>
@@ -4664,63 +6908,42 @@
         <p:spPr/>
         <p:txBody>
           <a:bodyPr>
-            <a:normAutofit fontScale="77500" lnSpcReduction="20000"/>
+            <a:normAutofit fontScale="92500"/>
           </a:bodyPr>
           <a:lstStyle/>
           <a:p>
-            <a:r>
-              <a:rPr lang="en-US" dirty="0" smtClean="0"/>
-              <a:t>Using </a:t>
-            </a:r>
-            <a:r>
-              <a:rPr lang="en-US" dirty="0" err="1" smtClean="0"/>
-              <a:t>async</a:t>
-            </a:r>
-            <a:r>
-              <a:rPr lang="en-US" dirty="0" smtClean="0"/>
-              <a:t> allows the runtime to return threads back to the thread pool so that they can process other requests</a:t>
-            </a:r>
-          </a:p>
-          <a:p>
-            <a:pPr lvl="1"/>
-            <a:r>
-              <a:rPr lang="en-US" dirty="0" smtClean="0"/>
-              <a:t>Improves application responsiveness</a:t>
-            </a:r>
-          </a:p>
-          <a:p>
-            <a:endParaRPr lang="en-US" dirty="0"/>
-          </a:p>
-          <a:p>
-            <a:r>
-              <a:rPr lang="en-US" dirty="0" smtClean="0"/>
-              <a:t>ASP.NET exposes multiple asynchrony points</a:t>
-            </a:r>
-          </a:p>
-          <a:p>
-            <a:pPr lvl="1"/>
             <a:r>
               <a:rPr lang="en-US" dirty="0" err="1" smtClean="0"/>
               <a:t>IHttpAsyncHandler</a:t>
             </a:r>
-            <a:r>
-              <a:rPr lang="en-US" dirty="0" smtClean="0"/>
-              <a:t> / </a:t>
-            </a:r>
+            <a:endParaRPr lang="en-US" dirty="0" smtClean="0"/>
+          </a:p>
+          <a:p>
             <a:r>
               <a:rPr lang="en-US" dirty="0" err="1" smtClean="0"/>
               <a:t>HttpTaskAsyncHandler</a:t>
             </a:r>
             <a:r>
               <a:rPr lang="en-US" dirty="0" smtClean="0"/>
-              <a:t> (4.5)</a:t>
-            </a:r>
-          </a:p>
-          <a:p>
-            <a:pPr lvl="1"/>
-            <a:r>
-              <a:rPr lang="en-US" dirty="0" smtClean="0"/>
-              <a:t>Asynchronous </a:t>
+              <a:t> </a:t>
+            </a:r>
+            <a:r>
+              <a:rPr lang="en-US" dirty="0" smtClean="0">
+                <a:solidFill>
+                  <a:srgbClr val="FF0000"/>
+                </a:solidFill>
+              </a:rPr>
+              <a:t>(4.5)</a:t>
+            </a:r>
+          </a:p>
+          <a:p>
+            <a:r>
+              <a:rPr lang="en-US" dirty="0" err="1" smtClean="0"/>
+              <a:t>Async</a:t>
+            </a:r>
+            <a:r>
+              <a:rPr lang="en-US" dirty="0" smtClean="0"/>
+              <a:t> </a:t>
             </a:r>
             <a:r>
               <a:rPr lang="en-US" dirty="0" err="1" smtClean="0"/>
@@ -4728,11 +6951,18 @@
             </a:r>
             <a:r>
               <a:rPr lang="en-US" dirty="0" smtClean="0"/>
-              <a:t> events</a:t>
-            </a:r>
-          </a:p>
-          <a:p>
-            <a:pPr lvl="1"/>
+              <a:t> events (</a:t>
+            </a:r>
+            <a:r>
+              <a:rPr lang="en-US" dirty="0" err="1" smtClean="0"/>
+              <a:t>BeginRequest</a:t>
+            </a:r>
+            <a:r>
+              <a:rPr lang="en-US" dirty="0" smtClean="0"/>
+              <a:t>, etc.)</a:t>
+            </a:r>
+          </a:p>
+          <a:p>
             <a:r>
               <a:rPr lang="en-US" dirty="0" smtClean="0"/>
               <a:t>&lt;%@ Page </a:t>
@@ -4747,10 +6977,39 @@
             </a:r>
           </a:p>
           <a:p>
-            <a:pPr lvl="1"/>
-            <a:r>
-              <a:rPr lang="en-US" dirty="0" smtClean="0"/>
-              <a:t>Asynchronous read / flush (4.5)</a:t>
+            <a:r>
+              <a:rPr lang="en-US" dirty="0" err="1" smtClean="0"/>
+              <a:t>WebSockets</a:t>
+            </a:r>
+            <a:r>
+              <a:rPr lang="en-US" dirty="0" smtClean="0"/>
+              <a:t> </a:t>
+            </a:r>
+            <a:r>
+              <a:rPr lang="en-US" dirty="0" smtClean="0">
+                <a:solidFill>
+                  <a:srgbClr val="FF0000"/>
+                </a:solidFill>
+              </a:rPr>
+              <a:t>(4.5)</a:t>
+            </a:r>
+          </a:p>
+          <a:p>
+            <a:r>
+              <a:rPr lang="en-US" dirty="0" err="1" smtClean="0"/>
+              <a:t>Async</a:t>
+            </a:r>
+            <a:r>
+              <a:rPr lang="en-US" dirty="0" smtClean="0"/>
+              <a:t> read request &amp; flush response </a:t>
+            </a:r>
+            <a:r>
+              <a:rPr lang="en-US" dirty="0" smtClean="0">
+                <a:solidFill>
+                  <a:srgbClr val="FF0000"/>
+                </a:solidFill>
+              </a:rPr>
+              <a:t>(4.5)</a:t>
             </a:r>
           </a:p>
         </p:txBody>
@@ -4758,7 +7017,7 @@
     </p:spTree>
     <p:extLst>
       <p:ext uri="{BB962C8B-B14F-4D97-AF65-F5344CB8AC3E}">
-        <p14:creationId xmlns:p14="http://schemas.microsoft.com/office/powerpoint/2010/main" val="3047549468"/>
+        <p14:creationId xmlns:p14="http://schemas.microsoft.com/office/powerpoint/2010/main" val="2614785245"/>
       </p:ext>
     </p:extLst>
   </p:cSld>
@@ -4808,114 +7067,97 @@
           <a:lstStyle/>
           <a:p>
             <a:r>
-              <a:rPr lang="en-US" dirty="0" smtClean="0"/>
-              <a:t>ASP.NET threading model</a:t>
-            </a:r>
-            <a:endParaRPr lang="en-US" dirty="0"/>
-          </a:p>
-        </p:txBody>
-      </p:sp>
-      <p:sp>
-        <p:nvSpPr>
-          <p:cNvPr id="3" name="Content Placeholder 2"/>
-          <p:cNvSpPr>
-            <a:spLocks noGrp="1"/>
-          </p:cNvSpPr>
-          <p:nvPr>
-            <p:ph idx="1"/>
-          </p:nvPr>
-        </p:nvSpPr>
-        <p:spPr/>
-        <p:txBody>
-          <a:bodyPr>
-            <a:normAutofit fontScale="85000" lnSpcReduction="10000"/>
-          </a:bodyPr>
-          <a:lstStyle/>
-          <a:p>
-            <a:r>
-              <a:rPr lang="en-US" dirty="0" smtClean="0"/>
-              <a:t>There is no concept of a </a:t>
-            </a:r>
-            <a:r>
-              <a:rPr lang="en-US" i="1" dirty="0" smtClean="0"/>
-              <a:t>UI thread</a:t>
-            </a:r>
-          </a:p>
-          <a:p>
-            <a:endParaRPr lang="en-US" dirty="0"/>
-          </a:p>
-          <a:p>
-            <a:r>
-              <a:rPr lang="en-US" dirty="0" smtClean="0"/>
-              <a:t>But ASP.NET does have a concept of a </a:t>
-            </a:r>
-            <a:r>
-              <a:rPr lang="en-US" i="1" dirty="0" smtClean="0"/>
-              <a:t>request thread</a:t>
-            </a:r>
-          </a:p>
-          <a:p>
-            <a:pPr lvl="1"/>
-            <a:r>
-              <a:rPr lang="en-US" dirty="0" smtClean="0"/>
-              <a:t>Use this thread to access </a:t>
-            </a:r>
-            <a:r>
               <a:rPr lang="en-US" dirty="0" err="1" smtClean="0"/>
               <a:t>HttpContext</a:t>
             </a:r>
             <a:r>
               <a:rPr lang="en-US" dirty="0" smtClean="0"/>
-              <a:t> and other intrinsic objects</a:t>
-            </a:r>
-          </a:p>
-          <a:p>
-            <a:pPr lvl="1"/>
-            <a:r>
-              <a:rPr lang="en-US" dirty="0" smtClean="0"/>
-              <a:t>On the request thread, </a:t>
-            </a:r>
+              <a:t>, Threads, and You</a:t>
+            </a:r>
+            <a:endParaRPr lang="en-US" dirty="0"/>
+          </a:p>
+        </p:txBody>
+      </p:sp>
+      <p:sp>
+        <p:nvSpPr>
+          <p:cNvPr id="3" name="Content Placeholder 2"/>
+          <p:cNvSpPr>
+            <a:spLocks noGrp="1"/>
+          </p:cNvSpPr>
+          <p:nvPr>
+            <p:ph idx="1"/>
+          </p:nvPr>
+        </p:nvSpPr>
+        <p:spPr/>
+        <p:txBody>
+          <a:bodyPr>
+            <a:normAutofit/>
+          </a:bodyPr>
+          <a:lstStyle/>
+          <a:p>
             <a:r>
               <a:rPr lang="en-US" dirty="0" err="1" smtClean="0"/>
-              <a:t>HttpContext.Current</a:t>
-            </a:r>
-            <a:r>
-              <a:rPr lang="en-US" dirty="0" smtClean="0"/>
-              <a:t> != null</a:t>
-            </a:r>
-          </a:p>
-          <a:p>
-            <a:pPr lvl="1"/>
-            <a:r>
-              <a:rPr lang="en-US" dirty="0" smtClean="0"/>
-              <a:t>To dispatch to the request thread, use </a:t>
+              <a:t>HttpContext</a:t>
+            </a:r>
+            <a:r>
+              <a:rPr lang="en-US" dirty="0" smtClean="0"/>
+              <a:t>, </a:t>
             </a:r>
             <a:r>
               <a:rPr lang="en-US" dirty="0" err="1" smtClean="0"/>
+              <a:t>HttpRequest</a:t>
+            </a:r>
+            <a:r>
+              <a:rPr lang="en-US" dirty="0" smtClean="0"/>
+              <a:t>, etc. are only “safe” to access from the </a:t>
+            </a:r>
+            <a:r>
+              <a:rPr lang="en-US" i="1" dirty="0" smtClean="0"/>
+              <a:t>request </a:t>
+            </a:r>
+            <a:r>
+              <a:rPr lang="en-US" i="1" dirty="0" smtClean="0"/>
+              <a:t>thread</a:t>
+            </a:r>
+          </a:p>
+          <a:p>
+            <a:pPr marL="0" indent="0">
+              <a:buNone/>
+            </a:pPr>
+            <a:endParaRPr lang="en-US" dirty="0"/>
+          </a:p>
+          <a:p>
+            <a:pPr marL="0" indent="0">
+              <a:buNone/>
+            </a:pPr>
+            <a:r>
+              <a:rPr lang="en-US" i="1" dirty="0" smtClean="0"/>
+              <a:t>Use </a:t>
+            </a:r>
+            <a:r>
+              <a:rPr lang="en-US" i="1" dirty="0" err="1" smtClean="0"/>
               <a:t>SynchronizationContext.Post</a:t>
             </a:r>
             <a:r>
-              <a:rPr lang="en-US" dirty="0" smtClean="0"/>
+              <a:rPr lang="en-US" i="1" dirty="0" smtClean="0"/>
               <a:t> or </a:t>
             </a:r>
             <a:r>
-              <a:rPr lang="en-US" dirty="0" err="1" smtClean="0"/>
+              <a:rPr lang="en-US" i="1" dirty="0" err="1" smtClean="0"/>
               <a:t>async</a:t>
             </a:r>
             <a:r>
-              <a:rPr lang="en-US" dirty="0" smtClean="0"/>
+              <a:rPr lang="en-US" i="1" dirty="0" smtClean="0"/>
               <a:t> / await</a:t>
             </a:r>
-          </a:p>
-          <a:p>
-            <a:endParaRPr lang="en-US" dirty="0"/>
+            <a:endParaRPr lang="en-US" i="1" dirty="0"/>
           </a:p>
         </p:txBody>
       </p:sp>
     </p:spTree>
     <p:extLst>
       <p:ext uri="{BB962C8B-B14F-4D97-AF65-F5344CB8AC3E}">
-        <p14:creationId xmlns:p14="http://schemas.microsoft.com/office/powerpoint/2010/main" val="4087071853"/>
+        <p14:creationId xmlns:p14="http://schemas.microsoft.com/office/powerpoint/2010/main" val="3364521650"/>
       </p:ext>
     </p:extLst>
   </p:cSld>
@@ -5227,11 +7469,7 @@
           <a:p>
             <a:r>
               <a:rPr lang="en-US" dirty="0" smtClean="0"/>
-              <a:t>I/O is highly optimized in </a:t>
-            </a:r>
-            <a:r>
-              <a:rPr lang="en-US" dirty="0" smtClean="0"/>
-              <a:t>Windows</a:t>
+              <a:t>I/O is highly optimized in Windows</a:t>
             </a:r>
             <a:endParaRPr lang="en-US" dirty="0"/>
           </a:p>
@@ -5248,7 +7486,6 @@
               <a:rPr lang="en-US" dirty="0" smtClean="0"/>
               <a:t> I/O lets ASP.NET “reclaim” your thread while waiting for the operation to complete</a:t>
             </a:r>
-            <a:endParaRPr lang="en-US" dirty="0" smtClean="0"/>
           </a:p>
         </p:txBody>
       </p:sp>
@@ -6704,13 +8941,8 @@
           <a:p>
             <a:r>
               <a:rPr lang="en-US" dirty="0" smtClean="0"/>
-              <a:t>ASP.NET processes requests on the CLR thread </a:t>
-            </a:r>
-            <a:r>
-              <a:rPr lang="en-US" dirty="0" smtClean="0"/>
-              <a:t>pool</a:t>
-            </a:r>
-            <a:endParaRPr lang="en-US" dirty="0" smtClean="0"/>
+              <a:t>ASP.NET processes requests on the CLR thread pool</a:t>
+            </a:r>
           </a:p>
           <a:p>
             <a:r>
@@ -6727,27 +8959,14 @@
             </a:r>
             <a:r>
               <a:rPr lang="en-US" dirty="0" smtClean="0"/>
-              <a:t>, and similar APIs dispatch work to this same thread </a:t>
-            </a:r>
-            <a:r>
-              <a:rPr lang="en-US" dirty="0" smtClean="0"/>
-              <a:t>pool</a:t>
-            </a:r>
-          </a:p>
-          <a:p>
-            <a:r>
-              <a:rPr lang="en-US" dirty="0" smtClean="0"/>
-              <a:t>Don’t </a:t>
-            </a:r>
-            <a:r>
-              <a:rPr lang="en-US" dirty="0" smtClean="0"/>
-              <a:t>call these APIs just for the sake of hopping threads; you’ll incur the cost of the thread hop but won’t actually release any resources that ASP.NET can </a:t>
-            </a:r>
-            <a:r>
-              <a:rPr lang="en-US" dirty="0" smtClean="0"/>
-              <a:t>utilize</a:t>
-            </a:r>
-            <a:endParaRPr lang="en-US" dirty="0" smtClean="0"/>
+              <a:t>, and similar APIs dispatch work to this same thread pool</a:t>
+            </a:r>
+          </a:p>
+          <a:p>
+            <a:r>
+              <a:rPr lang="en-US" dirty="0" smtClean="0"/>
+              <a:t>Don’t call these APIs just for the sake of hopping threads; you’ll incur the cost of the thread hop but won’t actually release any resources that ASP.NET can utilize</a:t>
+            </a:r>
           </a:p>
         </p:txBody>
       </p:sp>

</xml_diff>